<commit_message>
Update jvm|feat: AOP timing
</commit_message>
<xml_diff>
--- a/01-예제로 배우는 스프링 입문/assets/image.pptx
+++ b/01-예제로 배우는 스프링 입문/assets/image.pptx
@@ -6,18 +6,19 @@
   </p:sldMasterIdLst>
   <p:sldIdLst>
     <p:sldId id="257" r:id="rId2"/>
-    <p:sldId id="258" r:id="rId3"/>
-    <p:sldId id="259" r:id="rId4"/>
-    <p:sldId id="260" r:id="rId5"/>
-    <p:sldId id="261" r:id="rId6"/>
-    <p:sldId id="262" r:id="rId7"/>
-    <p:sldId id="263" r:id="rId8"/>
-    <p:sldId id="264" r:id="rId9"/>
-    <p:sldId id="265" r:id="rId10"/>
-    <p:sldId id="266" r:id="rId11"/>
-    <p:sldId id="267" r:id="rId12"/>
-    <p:sldId id="268" r:id="rId13"/>
-    <p:sldId id="269" r:id="rId14"/>
+    <p:sldId id="259" r:id="rId3"/>
+    <p:sldId id="258" r:id="rId4"/>
+    <p:sldId id="270" r:id="rId5"/>
+    <p:sldId id="260" r:id="rId6"/>
+    <p:sldId id="261" r:id="rId7"/>
+    <p:sldId id="262" r:id="rId8"/>
+    <p:sldId id="263" r:id="rId9"/>
+    <p:sldId id="264" r:id="rId10"/>
+    <p:sldId id="265" r:id="rId11"/>
+    <p:sldId id="266" r:id="rId12"/>
+    <p:sldId id="267" r:id="rId13"/>
+    <p:sldId id="268" r:id="rId14"/>
+    <p:sldId id="269" r:id="rId15"/>
   </p:sldIdLst>
   <p:sldSz cx="12192000" cy="6858000"/>
   <p:notesSz cx="6858000" cy="9144000"/>
@@ -116,6 +117,11 @@
       </a:defRPr>
     </a:lvl9pPr>
   </p:defaultTextStyle>
+  <p:extLst>
+    <p:ext uri="{EFAFB233-063F-42B5-8137-9DF3F51BA10A}">
+      <p15:sldGuideLst xmlns:p15="http://schemas.microsoft.com/office/powerpoint/2012/main"/>
+    </p:ext>
+  </p:extLst>
 </p:presentation>
 </file>
 
@@ -268,7 +274,7 @@
           <a:p>
             <a:fld id="{EF2EB35E-13FD-F94C-B7A0-5CBAADB7B5AD}" type="datetimeFigureOut">
               <a:rPr kumimoji="1" lang="ko-Kore-KR" altLang="en-US" smtClean="0"/>
-              <a:t>2021. 5. 5.</a:t>
+              <a:t>2021. 5. 13.</a:t>
             </a:fld>
             <a:endParaRPr kumimoji="1" lang="ko-Kore-KR" altLang="en-US"/>
           </a:p>
@@ -468,7 +474,7 @@
           <a:p>
             <a:fld id="{EF2EB35E-13FD-F94C-B7A0-5CBAADB7B5AD}" type="datetimeFigureOut">
               <a:rPr kumimoji="1" lang="ko-Kore-KR" altLang="en-US" smtClean="0"/>
-              <a:t>2021. 5. 5.</a:t>
+              <a:t>2021. 5. 13.</a:t>
             </a:fld>
             <a:endParaRPr kumimoji="1" lang="ko-Kore-KR" altLang="en-US"/>
           </a:p>
@@ -678,7 +684,7 @@
           <a:p>
             <a:fld id="{EF2EB35E-13FD-F94C-B7A0-5CBAADB7B5AD}" type="datetimeFigureOut">
               <a:rPr kumimoji="1" lang="ko-Kore-KR" altLang="en-US" smtClean="0"/>
-              <a:t>2021. 5. 5.</a:t>
+              <a:t>2021. 5. 13.</a:t>
             </a:fld>
             <a:endParaRPr kumimoji="1" lang="ko-Kore-KR" altLang="en-US"/>
           </a:p>
@@ -878,7 +884,7 @@
           <a:p>
             <a:fld id="{EF2EB35E-13FD-F94C-B7A0-5CBAADB7B5AD}" type="datetimeFigureOut">
               <a:rPr kumimoji="1" lang="ko-Kore-KR" altLang="en-US" smtClean="0"/>
-              <a:t>2021. 5. 5.</a:t>
+              <a:t>2021. 5. 13.</a:t>
             </a:fld>
             <a:endParaRPr kumimoji="1" lang="ko-Kore-KR" altLang="en-US"/>
           </a:p>
@@ -1154,7 +1160,7 @@
           <a:p>
             <a:fld id="{EF2EB35E-13FD-F94C-B7A0-5CBAADB7B5AD}" type="datetimeFigureOut">
               <a:rPr kumimoji="1" lang="ko-Kore-KR" altLang="en-US" smtClean="0"/>
-              <a:t>2021. 5. 5.</a:t>
+              <a:t>2021. 5. 13.</a:t>
             </a:fld>
             <a:endParaRPr kumimoji="1" lang="ko-Kore-KR" altLang="en-US"/>
           </a:p>
@@ -1422,7 +1428,7 @@
           <a:p>
             <a:fld id="{EF2EB35E-13FD-F94C-B7A0-5CBAADB7B5AD}" type="datetimeFigureOut">
               <a:rPr kumimoji="1" lang="ko-Kore-KR" altLang="en-US" smtClean="0"/>
-              <a:t>2021. 5. 5.</a:t>
+              <a:t>2021. 5. 13.</a:t>
             </a:fld>
             <a:endParaRPr kumimoji="1" lang="ko-Kore-KR" altLang="en-US"/>
           </a:p>
@@ -1837,7 +1843,7 @@
           <a:p>
             <a:fld id="{EF2EB35E-13FD-F94C-B7A0-5CBAADB7B5AD}" type="datetimeFigureOut">
               <a:rPr kumimoji="1" lang="ko-Kore-KR" altLang="en-US" smtClean="0"/>
-              <a:t>2021. 5. 5.</a:t>
+              <a:t>2021. 5. 13.</a:t>
             </a:fld>
             <a:endParaRPr kumimoji="1" lang="ko-Kore-KR" altLang="en-US"/>
           </a:p>
@@ -1979,7 +1985,7 @@
           <a:p>
             <a:fld id="{EF2EB35E-13FD-F94C-B7A0-5CBAADB7B5AD}" type="datetimeFigureOut">
               <a:rPr kumimoji="1" lang="ko-Kore-KR" altLang="en-US" smtClean="0"/>
-              <a:t>2021. 5. 5.</a:t>
+              <a:t>2021. 5. 13.</a:t>
             </a:fld>
             <a:endParaRPr kumimoji="1" lang="ko-Kore-KR" altLang="en-US"/>
           </a:p>
@@ -2092,7 +2098,7 @@
           <a:p>
             <a:fld id="{EF2EB35E-13FD-F94C-B7A0-5CBAADB7B5AD}" type="datetimeFigureOut">
               <a:rPr kumimoji="1" lang="ko-Kore-KR" altLang="en-US" smtClean="0"/>
-              <a:t>2021. 5. 5.</a:t>
+              <a:t>2021. 5. 13.</a:t>
             </a:fld>
             <a:endParaRPr kumimoji="1" lang="ko-Kore-KR" altLang="en-US"/>
           </a:p>
@@ -2405,7 +2411,7 @@
           <a:p>
             <a:fld id="{EF2EB35E-13FD-F94C-B7A0-5CBAADB7B5AD}" type="datetimeFigureOut">
               <a:rPr kumimoji="1" lang="ko-Kore-KR" altLang="en-US" smtClean="0"/>
-              <a:t>2021. 5. 5.</a:t>
+              <a:t>2021. 5. 13.</a:t>
             </a:fld>
             <a:endParaRPr kumimoji="1" lang="ko-Kore-KR" altLang="en-US"/>
           </a:p>
@@ -2694,7 +2700,7 @@
           <a:p>
             <a:fld id="{EF2EB35E-13FD-F94C-B7A0-5CBAADB7B5AD}" type="datetimeFigureOut">
               <a:rPr kumimoji="1" lang="ko-Kore-KR" altLang="en-US" smtClean="0"/>
-              <a:t>2021. 5. 5.</a:t>
+              <a:t>2021. 5. 13.</a:t>
             </a:fld>
             <a:endParaRPr kumimoji="1" lang="ko-Kore-KR" altLang="en-US"/>
           </a:p>
@@ -2937,7 +2943,7 @@
           <a:p>
             <a:fld id="{EF2EB35E-13FD-F94C-B7A0-5CBAADB7B5AD}" type="datetimeFigureOut">
               <a:rPr kumimoji="1" lang="ko-Kore-KR" altLang="en-US" smtClean="0"/>
-              <a:t>2021. 5. 5.</a:t>
+              <a:t>2021. 5. 13.</a:t>
             </a:fld>
             <a:endParaRPr kumimoji="1" lang="ko-Kore-KR" altLang="en-US"/>
           </a:p>
@@ -3697,7 +3703,7 @@
     </p:spTree>
     <p:extLst>
       <p:ext uri="{BB962C8B-B14F-4D97-AF65-F5344CB8AC3E}">
-        <p14:creationId xmlns:p14="http://schemas.microsoft.com/office/powerpoint/2010/main" val="2491616150"/>
+        <p14:creationId xmlns:p14="http://schemas.microsoft.com/office/powerpoint/2010/main" val="789122042"/>
       </p:ext>
     </p:extLst>
   </p:cSld>
@@ -3727,7 +3733,7 @@
     </p:spTree>
     <p:extLst>
       <p:ext uri="{BB962C8B-B14F-4D97-AF65-F5344CB8AC3E}">
-        <p14:creationId xmlns:p14="http://schemas.microsoft.com/office/powerpoint/2010/main" val="2931192852"/>
+        <p14:creationId xmlns:p14="http://schemas.microsoft.com/office/powerpoint/2010/main" val="2491616150"/>
       </p:ext>
     </p:extLst>
   </p:cSld>
@@ -3757,6 +3763,36 @@
     </p:spTree>
     <p:extLst>
       <p:ext uri="{BB962C8B-B14F-4D97-AF65-F5344CB8AC3E}">
+        <p14:creationId xmlns:p14="http://schemas.microsoft.com/office/powerpoint/2010/main" val="2931192852"/>
+      </p:ext>
+    </p:extLst>
+  </p:cSld>
+  <p:clrMapOvr>
+    <a:masterClrMapping/>
+  </p:clrMapOvr>
+</p:sld>
+</file>
+
+<file path=ppt/slides/slide13.xml><?xml version="1.0" encoding="utf-8"?>
+<p:sld xmlns:a="http://schemas.openxmlformats.org/drawingml/2006/main" xmlns:r="http://schemas.openxmlformats.org/officeDocument/2006/relationships" xmlns:p="http://schemas.openxmlformats.org/presentationml/2006/main">
+  <p:cSld>
+    <p:spTree>
+      <p:nvGrpSpPr>
+        <p:cNvPr id="1" name=""/>
+        <p:cNvGrpSpPr/>
+        <p:nvPr/>
+      </p:nvGrpSpPr>
+      <p:grpSpPr>
+        <a:xfrm>
+          <a:off x="0" y="0"/>
+          <a:ext cx="0" cy="0"/>
+          <a:chOff x="0" y="0"/>
+          <a:chExt cx="0" cy="0"/>
+        </a:xfrm>
+      </p:grpSpPr>
+    </p:spTree>
+    <p:extLst>
+      <p:ext uri="{BB962C8B-B14F-4D97-AF65-F5344CB8AC3E}">
         <p14:creationId xmlns:p14="http://schemas.microsoft.com/office/powerpoint/2010/main" val="4027050657"/>
       </p:ext>
     </p:extLst>
@@ -3767,7 +3803,7 @@
 </p:sld>
 </file>
 
-<file path=ppt/slides/slide13.xml><?xml version="1.0" encoding="utf-8"?>
+<file path=ppt/slides/slide14.xml><?xml version="1.0" encoding="utf-8"?>
 <p:sld xmlns:a="http://schemas.openxmlformats.org/drawingml/2006/main" xmlns:r="http://schemas.openxmlformats.org/officeDocument/2006/relationships" xmlns:p="http://schemas.openxmlformats.org/presentationml/2006/main">
   <p:cSld>
     <p:spTree>
@@ -3814,12 +3850,779 @@
           <a:chExt cx="0" cy="0"/>
         </a:xfrm>
       </p:grpSpPr>
+      <p:sp>
+        <p:nvSpPr>
+          <p:cNvPr id="3" name="모서리가 둥근 직사각형 2">
+            <a:extLst>
+              <a:ext uri="{FF2B5EF4-FFF2-40B4-BE49-F238E27FC236}">
+                <a16:creationId xmlns:a16="http://schemas.microsoft.com/office/drawing/2014/main" id="{C97A4CEB-9C7E-1F43-B253-AEDEB2EE4FB8}"/>
+              </a:ext>
+            </a:extLst>
+          </p:cNvPr>
+          <p:cNvSpPr/>
+          <p:nvPr/>
+        </p:nvSpPr>
+        <p:spPr>
+          <a:xfrm>
+            <a:off x="2142755" y="3278683"/>
+            <a:ext cx="4615398" cy="2218227"/>
+          </a:xfrm>
+          <a:prstGeom prst="roundRect">
+            <a:avLst/>
+          </a:prstGeom>
+          <a:noFill/>
+        </p:spPr>
+        <p:style>
+          <a:lnRef idx="2">
+            <a:schemeClr val="accent1">
+              <a:shade val="50000"/>
+            </a:schemeClr>
+          </a:lnRef>
+          <a:fillRef idx="1">
+            <a:schemeClr val="accent1"/>
+          </a:fillRef>
+          <a:effectRef idx="0">
+            <a:schemeClr val="accent1"/>
+          </a:effectRef>
+          <a:fontRef idx="minor">
+            <a:schemeClr val="lt1"/>
+          </a:fontRef>
+        </p:style>
+        <p:txBody>
+          <a:bodyPr rtlCol="0" anchor="ctr"/>
+          <a:lstStyle/>
+          <a:p>
+            <a:pPr algn="ctr"/>
+            <a:endParaRPr kumimoji="1" lang="ko-Kore-KR" altLang="en-US"/>
+          </a:p>
+        </p:txBody>
+      </p:sp>
+      <p:sp>
+        <p:nvSpPr>
+          <p:cNvPr id="4" name="TextBox 3">
+            <a:extLst>
+              <a:ext uri="{FF2B5EF4-FFF2-40B4-BE49-F238E27FC236}">
+                <a16:creationId xmlns:a16="http://schemas.microsoft.com/office/drawing/2014/main" id="{8F35B25F-333A-BA44-9929-D9294C571EAB}"/>
+              </a:ext>
+            </a:extLst>
+          </p:cNvPr>
+          <p:cNvSpPr txBox="1"/>
+          <p:nvPr/>
+        </p:nvSpPr>
+        <p:spPr>
+          <a:xfrm>
+            <a:off x="3849990" y="1037282"/>
+            <a:ext cx="1107996" cy="646331"/>
+          </a:xfrm>
+          <a:prstGeom prst="rect">
+            <a:avLst/>
+          </a:prstGeom>
+          <a:noFill/>
+          <a:ln>
+            <a:noFill/>
+          </a:ln>
+        </p:spPr>
+        <p:txBody>
+          <a:bodyPr wrap="none" rtlCol="0">
+            <a:spAutoFit/>
+          </a:bodyPr>
+          <a:lstStyle/>
+          <a:p>
+            <a:pPr algn="ctr"/>
+            <a:r>
+              <a:rPr kumimoji="1" lang="ko-Kore-KR" altLang="en-US" dirty="0"/>
+              <a:t>소스파일</a:t>
+            </a:r>
+            <a:endParaRPr kumimoji="1" lang="en-US" altLang="ko-Kore-KR" dirty="0"/>
+          </a:p>
+          <a:p>
+            <a:pPr algn="ctr"/>
+            <a:r>
+              <a:rPr kumimoji="1" lang="en-US" altLang="ko-Kore-KR" dirty="0"/>
+              <a:t>(*.java</a:t>
+            </a:r>
+            <a:r>
+              <a:rPr kumimoji="1" lang="en-US" altLang="ko-KR" dirty="0"/>
+              <a:t>)</a:t>
+            </a:r>
+            <a:endParaRPr kumimoji="1" lang="ko-Kore-KR" altLang="en-US" dirty="0"/>
+          </a:p>
+        </p:txBody>
+      </p:sp>
+      <p:sp>
+        <p:nvSpPr>
+          <p:cNvPr id="5" name="TextBox 4">
+            <a:extLst>
+              <a:ext uri="{FF2B5EF4-FFF2-40B4-BE49-F238E27FC236}">
+                <a16:creationId xmlns:a16="http://schemas.microsoft.com/office/drawing/2014/main" id="{EFCEFBC8-6592-A649-9665-2B3A6BB356BC}"/>
+              </a:ext>
+            </a:extLst>
+          </p:cNvPr>
+          <p:cNvSpPr txBox="1"/>
+          <p:nvPr/>
+        </p:nvSpPr>
+        <p:spPr>
+          <a:xfrm>
+            <a:off x="3450842" y="2138648"/>
+            <a:ext cx="1906291" cy="646331"/>
+          </a:xfrm>
+          <a:prstGeom prst="rect">
+            <a:avLst/>
+          </a:prstGeom>
+          <a:noFill/>
+          <a:ln>
+            <a:noFill/>
+          </a:ln>
+        </p:spPr>
+        <p:txBody>
+          <a:bodyPr wrap="none" rtlCol="0">
+            <a:spAutoFit/>
+          </a:bodyPr>
+          <a:lstStyle/>
+          <a:p>
+            <a:pPr algn="ctr"/>
+            <a:r>
+              <a:rPr kumimoji="1" lang="ko-KR" altLang="en-US"/>
+              <a:t>바이트 코드 </a:t>
+            </a:r>
+            <a:r>
+              <a:rPr kumimoji="1" lang="ko-Kore-KR" altLang="en-US"/>
+              <a:t>파일</a:t>
+            </a:r>
+            <a:endParaRPr kumimoji="1" lang="en-US" altLang="ko-Kore-KR"/>
+          </a:p>
+          <a:p>
+            <a:pPr algn="ctr"/>
+            <a:r>
+              <a:rPr kumimoji="1" lang="en-US" altLang="ko-Kore-KR"/>
+              <a:t>(*.class</a:t>
+            </a:r>
+            <a:r>
+              <a:rPr kumimoji="1" lang="en-US" altLang="ko-KR"/>
+              <a:t>)</a:t>
+            </a:r>
+            <a:endParaRPr kumimoji="1" lang="ko-Kore-KR" altLang="en-US" dirty="0"/>
+          </a:p>
+        </p:txBody>
+      </p:sp>
+      <p:sp>
+        <p:nvSpPr>
+          <p:cNvPr id="7" name="TextBox 6">
+            <a:extLst>
+              <a:ext uri="{FF2B5EF4-FFF2-40B4-BE49-F238E27FC236}">
+                <a16:creationId xmlns:a16="http://schemas.microsoft.com/office/drawing/2014/main" id="{B280C002-F03B-0340-B2D7-EAAA8E50859C}"/>
+              </a:ext>
+            </a:extLst>
+          </p:cNvPr>
+          <p:cNvSpPr txBox="1"/>
+          <p:nvPr/>
+        </p:nvSpPr>
+        <p:spPr>
+          <a:xfrm>
+            <a:off x="3708123" y="3644404"/>
+            <a:ext cx="1391728" cy="369332"/>
+          </a:xfrm>
+          <a:prstGeom prst="rect">
+            <a:avLst/>
+          </a:prstGeom>
+          <a:noFill/>
+          <a:ln>
+            <a:solidFill>
+              <a:schemeClr val="bg2">
+                <a:lumMod val="75000"/>
+              </a:schemeClr>
+            </a:solidFill>
+          </a:ln>
+        </p:spPr>
+        <p:txBody>
+          <a:bodyPr wrap="none" rtlCol="0">
+            <a:spAutoFit/>
+          </a:bodyPr>
+          <a:lstStyle/>
+          <a:p>
+            <a:r>
+              <a:rPr kumimoji="1" lang="ko-Kore-KR" altLang="en-US" dirty="0"/>
+              <a:t>클래스</a:t>
+            </a:r>
+            <a:r>
+              <a:rPr kumimoji="1" lang="ko-KR" altLang="en-US" dirty="0"/>
+              <a:t> </a:t>
+            </a:r>
+            <a:r>
+              <a:rPr kumimoji="1" lang="ko-KR" altLang="en-US" dirty="0" err="1"/>
+              <a:t>로더</a:t>
+            </a:r>
+            <a:endParaRPr kumimoji="1" lang="ko-Kore-KR" altLang="en-US" dirty="0"/>
+          </a:p>
+        </p:txBody>
+      </p:sp>
+      <p:sp>
+        <p:nvSpPr>
+          <p:cNvPr id="8" name="TextBox 7">
+            <a:extLst>
+              <a:ext uri="{FF2B5EF4-FFF2-40B4-BE49-F238E27FC236}">
+                <a16:creationId xmlns:a16="http://schemas.microsoft.com/office/drawing/2014/main" id="{6FBC1FB5-CEB0-D74D-A34E-935536C2AE27}"/>
+              </a:ext>
+            </a:extLst>
+          </p:cNvPr>
+          <p:cNvSpPr txBox="1"/>
+          <p:nvPr/>
+        </p:nvSpPr>
+        <p:spPr>
+          <a:xfrm>
+            <a:off x="2754978" y="4511051"/>
+            <a:ext cx="1391728" cy="646331"/>
+          </a:xfrm>
+          <a:prstGeom prst="rect">
+            <a:avLst/>
+          </a:prstGeom>
+          <a:noFill/>
+          <a:ln>
+            <a:solidFill>
+              <a:schemeClr val="bg2">
+                <a:lumMod val="75000"/>
+              </a:schemeClr>
+            </a:solidFill>
+          </a:ln>
+        </p:spPr>
+        <p:txBody>
+          <a:bodyPr wrap="none" rtlCol="0">
+            <a:spAutoFit/>
+          </a:bodyPr>
+          <a:lstStyle/>
+          <a:p>
+            <a:pPr algn="ctr"/>
+            <a:r>
+              <a:rPr kumimoji="1" lang="ko-KR" altLang="en-US" dirty="0"/>
+              <a:t>런타임 </a:t>
+            </a:r>
+            <a:endParaRPr kumimoji="1" lang="en-US" altLang="ko-KR" dirty="0"/>
+          </a:p>
+          <a:p>
+            <a:pPr algn="ctr"/>
+            <a:r>
+              <a:rPr kumimoji="1" lang="ko-KR" altLang="en-US" dirty="0"/>
+              <a:t>데이터 영역</a:t>
+            </a:r>
+            <a:endParaRPr kumimoji="1" lang="ko-Kore-KR" altLang="en-US" dirty="0"/>
+          </a:p>
+        </p:txBody>
+      </p:sp>
+      <p:sp>
+        <p:nvSpPr>
+          <p:cNvPr id="9" name="TextBox 8">
+            <a:extLst>
+              <a:ext uri="{FF2B5EF4-FFF2-40B4-BE49-F238E27FC236}">
+                <a16:creationId xmlns:a16="http://schemas.microsoft.com/office/drawing/2014/main" id="{CE47635C-8D33-8941-AC3D-3382274597EF}"/>
+              </a:ext>
+            </a:extLst>
+          </p:cNvPr>
+          <p:cNvSpPr txBox="1"/>
+          <p:nvPr/>
+        </p:nvSpPr>
+        <p:spPr>
+          <a:xfrm>
+            <a:off x="4856113" y="4649550"/>
+            <a:ext cx="1160895" cy="369332"/>
+          </a:xfrm>
+          <a:prstGeom prst="rect">
+            <a:avLst/>
+          </a:prstGeom>
+          <a:noFill/>
+          <a:ln>
+            <a:solidFill>
+              <a:schemeClr val="bg2">
+                <a:lumMod val="75000"/>
+              </a:schemeClr>
+            </a:solidFill>
+          </a:ln>
+        </p:spPr>
+        <p:txBody>
+          <a:bodyPr wrap="none" rtlCol="0">
+            <a:spAutoFit/>
+          </a:bodyPr>
+          <a:lstStyle/>
+          <a:p>
+            <a:r>
+              <a:rPr kumimoji="1" lang="ko-KR" altLang="en-US" dirty="0"/>
+              <a:t>실행 엔진</a:t>
+            </a:r>
+            <a:endParaRPr kumimoji="1" lang="ko-Kore-KR" altLang="en-US" dirty="0"/>
+          </a:p>
+        </p:txBody>
+      </p:sp>
+      <p:cxnSp>
+        <p:nvCxnSpPr>
+          <p:cNvPr id="10" name="직선 화살표 연결선 9">
+            <a:extLst>
+              <a:ext uri="{FF2B5EF4-FFF2-40B4-BE49-F238E27FC236}">
+                <a16:creationId xmlns:a16="http://schemas.microsoft.com/office/drawing/2014/main" id="{B08AEDD3-7CFA-9648-AE2C-CE3CD8580E73}"/>
+              </a:ext>
+            </a:extLst>
+          </p:cNvPr>
+          <p:cNvCxnSpPr>
+            <a:stCxn id="4" idx="2"/>
+            <a:endCxn id="5" idx="0"/>
+          </p:cNvCxnSpPr>
+          <p:nvPr/>
+        </p:nvCxnSpPr>
+        <p:spPr>
+          <a:xfrm>
+            <a:off x="4403988" y="1683613"/>
+            <a:ext cx="0" cy="455035"/>
+          </a:xfrm>
+          <a:prstGeom prst="straightConnector1">
+            <a:avLst/>
+          </a:prstGeom>
+          <a:ln>
+            <a:tailEnd type="triangle"/>
+          </a:ln>
+        </p:spPr>
+        <p:style>
+          <a:lnRef idx="1">
+            <a:schemeClr val="accent1"/>
+          </a:lnRef>
+          <a:fillRef idx="0">
+            <a:schemeClr val="accent1"/>
+          </a:fillRef>
+          <a:effectRef idx="0">
+            <a:schemeClr val="accent1"/>
+          </a:effectRef>
+          <a:fontRef idx="minor">
+            <a:schemeClr val="tx1"/>
+          </a:fontRef>
+        </p:style>
+      </p:cxnSp>
+      <p:sp>
+        <p:nvSpPr>
+          <p:cNvPr id="11" name="TextBox 10">
+            <a:extLst>
+              <a:ext uri="{FF2B5EF4-FFF2-40B4-BE49-F238E27FC236}">
+                <a16:creationId xmlns:a16="http://schemas.microsoft.com/office/drawing/2014/main" id="{826D1C12-0763-3740-9DCA-06796902E4C9}"/>
+              </a:ext>
+            </a:extLst>
+          </p:cNvPr>
+          <p:cNvSpPr txBox="1"/>
+          <p:nvPr/>
+        </p:nvSpPr>
+        <p:spPr>
+          <a:xfrm>
+            <a:off x="4535475" y="1728719"/>
+            <a:ext cx="1203406" cy="307777"/>
+          </a:xfrm>
+          <a:prstGeom prst="rect">
+            <a:avLst/>
+          </a:prstGeom>
+          <a:noFill/>
+        </p:spPr>
+        <p:txBody>
+          <a:bodyPr wrap="none" rtlCol="0">
+            <a:spAutoFit/>
+          </a:bodyPr>
+          <a:lstStyle/>
+          <a:p>
+            <a:r>
+              <a:rPr kumimoji="1" lang="en-US" altLang="ko-KR" sz="1400" dirty="0" err="1"/>
+              <a:t>j</a:t>
+            </a:r>
+            <a:r>
+              <a:rPr kumimoji="1" lang="en-US" altLang="ko-Kore-KR" sz="1400" dirty="0" err="1"/>
+              <a:t>avac</a:t>
+            </a:r>
+            <a:r>
+              <a:rPr kumimoji="1" lang="en-US" altLang="ko-KR" sz="1100" dirty="0"/>
+              <a:t>(</a:t>
+            </a:r>
+            <a:r>
+              <a:rPr kumimoji="1" lang="ko-KR" altLang="en-US" sz="1100" dirty="0"/>
+              <a:t>컴파일러</a:t>
+            </a:r>
+            <a:r>
+              <a:rPr kumimoji="1" lang="en-US" altLang="ko-KR" sz="1100" dirty="0"/>
+              <a:t>)</a:t>
+            </a:r>
+            <a:endParaRPr kumimoji="1" lang="ko-Kore-KR" altLang="en-US" sz="1100" dirty="0"/>
+          </a:p>
+        </p:txBody>
+      </p:sp>
+      <p:cxnSp>
+        <p:nvCxnSpPr>
+          <p:cNvPr id="12" name="직선 화살표 연결선 11">
+            <a:extLst>
+              <a:ext uri="{FF2B5EF4-FFF2-40B4-BE49-F238E27FC236}">
+                <a16:creationId xmlns:a16="http://schemas.microsoft.com/office/drawing/2014/main" id="{8F61A4F4-DC13-B548-B617-9E4C7F19197E}"/>
+              </a:ext>
+            </a:extLst>
+          </p:cNvPr>
+          <p:cNvCxnSpPr>
+            <a:cxnSpLocks/>
+            <a:stCxn id="5" idx="2"/>
+            <a:endCxn id="7" idx="0"/>
+          </p:cNvCxnSpPr>
+          <p:nvPr/>
+        </p:nvCxnSpPr>
+        <p:spPr>
+          <a:xfrm flipH="1">
+            <a:off x="4403987" y="2784979"/>
+            <a:ext cx="1" cy="859425"/>
+          </a:xfrm>
+          <a:prstGeom prst="straightConnector1">
+            <a:avLst/>
+          </a:prstGeom>
+          <a:ln>
+            <a:tailEnd type="triangle"/>
+          </a:ln>
+        </p:spPr>
+        <p:style>
+          <a:lnRef idx="1">
+            <a:schemeClr val="accent1"/>
+          </a:lnRef>
+          <a:fillRef idx="0">
+            <a:schemeClr val="accent1"/>
+          </a:fillRef>
+          <a:effectRef idx="0">
+            <a:schemeClr val="accent1"/>
+          </a:effectRef>
+          <a:fontRef idx="minor">
+            <a:schemeClr val="tx1"/>
+          </a:fontRef>
+        </p:style>
+      </p:cxnSp>
+      <p:cxnSp>
+        <p:nvCxnSpPr>
+          <p:cNvPr id="13" name="직선 화살표 연결선 12">
+            <a:extLst>
+              <a:ext uri="{FF2B5EF4-FFF2-40B4-BE49-F238E27FC236}">
+                <a16:creationId xmlns:a16="http://schemas.microsoft.com/office/drawing/2014/main" id="{31B8F0FB-BB6E-9747-90E7-1BF4C22F49BE}"/>
+              </a:ext>
+            </a:extLst>
+          </p:cNvPr>
+          <p:cNvCxnSpPr>
+            <a:stCxn id="7" idx="2"/>
+            <a:endCxn id="8" idx="0"/>
+          </p:cNvCxnSpPr>
+          <p:nvPr/>
+        </p:nvCxnSpPr>
+        <p:spPr>
+          <a:xfrm flipH="1">
+            <a:off x="3450842" y="4013736"/>
+            <a:ext cx="953145" cy="497315"/>
+          </a:xfrm>
+          <a:prstGeom prst="straightConnector1">
+            <a:avLst/>
+          </a:prstGeom>
+          <a:ln>
+            <a:headEnd type="triangle"/>
+            <a:tailEnd type="triangle"/>
+          </a:ln>
+        </p:spPr>
+        <p:style>
+          <a:lnRef idx="1">
+            <a:schemeClr val="accent1"/>
+          </a:lnRef>
+          <a:fillRef idx="0">
+            <a:schemeClr val="accent1"/>
+          </a:fillRef>
+          <a:effectRef idx="0">
+            <a:schemeClr val="accent1"/>
+          </a:effectRef>
+          <a:fontRef idx="minor">
+            <a:schemeClr val="tx1"/>
+          </a:fontRef>
+        </p:style>
+      </p:cxnSp>
+      <p:cxnSp>
+        <p:nvCxnSpPr>
+          <p:cNvPr id="14" name="직선 화살표 연결선 13">
+            <a:extLst>
+              <a:ext uri="{FF2B5EF4-FFF2-40B4-BE49-F238E27FC236}">
+                <a16:creationId xmlns:a16="http://schemas.microsoft.com/office/drawing/2014/main" id="{9DA1D3DC-A477-CC48-9FDC-D58C2C694C88}"/>
+              </a:ext>
+            </a:extLst>
+          </p:cNvPr>
+          <p:cNvCxnSpPr>
+            <a:cxnSpLocks/>
+            <a:stCxn id="7" idx="2"/>
+            <a:endCxn id="9" idx="0"/>
+          </p:cNvCxnSpPr>
+          <p:nvPr/>
+        </p:nvCxnSpPr>
+        <p:spPr>
+          <a:xfrm>
+            <a:off x="4403987" y="4013736"/>
+            <a:ext cx="1032574" cy="635814"/>
+          </a:xfrm>
+          <a:prstGeom prst="straightConnector1">
+            <a:avLst/>
+          </a:prstGeom>
+          <a:ln>
+            <a:headEnd type="triangle"/>
+            <a:tailEnd type="triangle"/>
+          </a:ln>
+        </p:spPr>
+        <p:style>
+          <a:lnRef idx="1">
+            <a:schemeClr val="accent1"/>
+          </a:lnRef>
+          <a:fillRef idx="0">
+            <a:schemeClr val="accent1"/>
+          </a:fillRef>
+          <a:effectRef idx="0">
+            <a:schemeClr val="accent1"/>
+          </a:effectRef>
+          <a:fontRef idx="minor">
+            <a:schemeClr val="tx1"/>
+          </a:fontRef>
+        </p:style>
+      </p:cxnSp>
+      <p:cxnSp>
+        <p:nvCxnSpPr>
+          <p:cNvPr id="15" name="직선 화살표 연결선 14">
+            <a:extLst>
+              <a:ext uri="{FF2B5EF4-FFF2-40B4-BE49-F238E27FC236}">
+                <a16:creationId xmlns:a16="http://schemas.microsoft.com/office/drawing/2014/main" id="{4FDBAEE5-6833-2F41-BF28-5671A8B487C5}"/>
+              </a:ext>
+            </a:extLst>
+          </p:cNvPr>
+          <p:cNvCxnSpPr>
+            <a:cxnSpLocks/>
+            <a:stCxn id="8" idx="3"/>
+            <a:endCxn id="9" idx="1"/>
+          </p:cNvCxnSpPr>
+          <p:nvPr/>
+        </p:nvCxnSpPr>
+        <p:spPr>
+          <a:xfrm flipV="1">
+            <a:off x="4146706" y="4834216"/>
+            <a:ext cx="709407" cy="1"/>
+          </a:xfrm>
+          <a:prstGeom prst="straightConnector1">
+            <a:avLst/>
+          </a:prstGeom>
+          <a:ln>
+            <a:headEnd type="triangle"/>
+            <a:tailEnd type="triangle"/>
+          </a:ln>
+        </p:spPr>
+        <p:style>
+          <a:lnRef idx="1">
+            <a:schemeClr val="accent1"/>
+          </a:lnRef>
+          <a:fillRef idx="0">
+            <a:schemeClr val="accent1"/>
+          </a:fillRef>
+          <a:effectRef idx="0">
+            <a:schemeClr val="accent1"/>
+          </a:effectRef>
+          <a:fontRef idx="minor">
+            <a:schemeClr val="tx1"/>
+          </a:fontRef>
+        </p:style>
+      </p:cxnSp>
+      <p:sp>
+        <p:nvSpPr>
+          <p:cNvPr id="16" name="직사각형 15">
+            <a:extLst>
+              <a:ext uri="{FF2B5EF4-FFF2-40B4-BE49-F238E27FC236}">
+                <a16:creationId xmlns:a16="http://schemas.microsoft.com/office/drawing/2014/main" id="{1FE5548B-0410-8643-B06D-8C8BCF8B36D4}"/>
+              </a:ext>
+            </a:extLst>
+          </p:cNvPr>
+          <p:cNvSpPr/>
+          <p:nvPr/>
+        </p:nvSpPr>
+        <p:spPr>
+          <a:xfrm>
+            <a:off x="1776248" y="3214691"/>
+            <a:ext cx="858909" cy="327295"/>
+          </a:xfrm>
+          <a:prstGeom prst="rect">
+            <a:avLst/>
+          </a:prstGeom>
+          <a:solidFill>
+            <a:schemeClr val="bg1"/>
+          </a:solidFill>
+          <a:ln>
+            <a:noFill/>
+          </a:ln>
+        </p:spPr>
+        <p:style>
+          <a:lnRef idx="2">
+            <a:schemeClr val="accent1">
+              <a:shade val="50000"/>
+            </a:schemeClr>
+          </a:lnRef>
+          <a:fillRef idx="1">
+            <a:schemeClr val="accent1"/>
+          </a:fillRef>
+          <a:effectRef idx="0">
+            <a:schemeClr val="accent1"/>
+          </a:effectRef>
+          <a:fontRef idx="minor">
+            <a:schemeClr val="lt1"/>
+          </a:fontRef>
+        </p:style>
+        <p:txBody>
+          <a:bodyPr rtlCol="0" anchor="ctr"/>
+          <a:lstStyle/>
+          <a:p>
+            <a:pPr algn="ctr"/>
+            <a:endParaRPr kumimoji="1" lang="ko-Kore-KR" altLang="en-US"/>
+          </a:p>
+        </p:txBody>
+      </p:sp>
+      <p:sp>
+        <p:nvSpPr>
+          <p:cNvPr id="6" name="TextBox 5">
+            <a:extLst>
+              <a:ext uri="{FF2B5EF4-FFF2-40B4-BE49-F238E27FC236}">
+                <a16:creationId xmlns:a16="http://schemas.microsoft.com/office/drawing/2014/main" id="{7420D458-4224-0240-94CB-2F4D63DCC230}"/>
+              </a:ext>
+            </a:extLst>
+          </p:cNvPr>
+          <p:cNvSpPr txBox="1"/>
+          <p:nvPr/>
+        </p:nvSpPr>
+        <p:spPr>
+          <a:xfrm>
+            <a:off x="1408142" y="3172654"/>
+            <a:ext cx="1242648" cy="369332"/>
+          </a:xfrm>
+          <a:prstGeom prst="rect">
+            <a:avLst/>
+          </a:prstGeom>
+          <a:noFill/>
+        </p:spPr>
+        <p:txBody>
+          <a:bodyPr wrap="none" rtlCol="0">
+            <a:spAutoFit/>
+          </a:bodyPr>
+          <a:lstStyle/>
+          <a:p>
+            <a:r>
+              <a:rPr kumimoji="1" lang="en-US" altLang="ko-KR" dirty="0"/>
+              <a:t>(</a:t>
+            </a:r>
+            <a:r>
+              <a:rPr kumimoji="1" lang="ko-KR" altLang="en-US" dirty="0" err="1"/>
+              <a:t>맥용</a:t>
+            </a:r>
+            <a:r>
+              <a:rPr kumimoji="1" lang="en-US" altLang="ko-KR" dirty="0"/>
+              <a:t>)</a:t>
+            </a:r>
+            <a:r>
+              <a:rPr kumimoji="1" lang="ko-KR" altLang="en-US" dirty="0"/>
+              <a:t> </a:t>
+            </a:r>
+            <a:r>
+              <a:rPr kumimoji="1" lang="en-US" altLang="ko-KR" dirty="0"/>
+              <a:t>JVM</a:t>
+            </a:r>
+            <a:endParaRPr kumimoji="1" lang="ko-Kore-KR" altLang="en-US" dirty="0"/>
+          </a:p>
+        </p:txBody>
+      </p:sp>
+      <p:sp>
+        <p:nvSpPr>
+          <p:cNvPr id="17" name="모서리가 둥근 직사각형 16">
+            <a:extLst>
+              <a:ext uri="{FF2B5EF4-FFF2-40B4-BE49-F238E27FC236}">
+                <a16:creationId xmlns:a16="http://schemas.microsoft.com/office/drawing/2014/main" id="{E1688E30-80A4-6441-BFCA-1ED0665A7043}"/>
+              </a:ext>
+            </a:extLst>
+          </p:cNvPr>
+          <p:cNvSpPr/>
+          <p:nvPr/>
+        </p:nvSpPr>
+        <p:spPr>
+          <a:xfrm>
+            <a:off x="3708124" y="945931"/>
+            <a:ext cx="1391728" cy="737682"/>
+          </a:xfrm>
+          <a:prstGeom prst="roundRect">
+            <a:avLst/>
+          </a:prstGeom>
+          <a:noFill/>
+        </p:spPr>
+        <p:style>
+          <a:lnRef idx="2">
+            <a:schemeClr val="accent1">
+              <a:shade val="50000"/>
+            </a:schemeClr>
+          </a:lnRef>
+          <a:fillRef idx="1">
+            <a:schemeClr val="accent1"/>
+          </a:fillRef>
+          <a:effectRef idx="0">
+            <a:schemeClr val="accent1"/>
+          </a:effectRef>
+          <a:fontRef idx="minor">
+            <a:schemeClr val="lt1"/>
+          </a:fontRef>
+        </p:style>
+        <p:txBody>
+          <a:bodyPr rtlCol="0" anchor="ctr"/>
+          <a:lstStyle/>
+          <a:p>
+            <a:pPr algn="ctr"/>
+            <a:endParaRPr kumimoji="1" lang="ko-Kore-KR" altLang="en-US"/>
+          </a:p>
+        </p:txBody>
+      </p:sp>
+      <p:sp>
+        <p:nvSpPr>
+          <p:cNvPr id="18" name="모서리가 둥근 직사각형 17">
+            <a:extLst>
+              <a:ext uri="{FF2B5EF4-FFF2-40B4-BE49-F238E27FC236}">
+                <a16:creationId xmlns:a16="http://schemas.microsoft.com/office/drawing/2014/main" id="{75A8564A-7541-8641-B092-54CB99F38CB7}"/>
+              </a:ext>
+            </a:extLst>
+          </p:cNvPr>
+          <p:cNvSpPr/>
+          <p:nvPr/>
+        </p:nvSpPr>
+        <p:spPr>
+          <a:xfrm>
+            <a:off x="3450842" y="2129499"/>
+            <a:ext cx="1906290" cy="642050"/>
+          </a:xfrm>
+          <a:prstGeom prst="roundRect">
+            <a:avLst/>
+          </a:prstGeom>
+          <a:noFill/>
+        </p:spPr>
+        <p:style>
+          <a:lnRef idx="2">
+            <a:schemeClr val="accent1">
+              <a:shade val="50000"/>
+            </a:schemeClr>
+          </a:lnRef>
+          <a:fillRef idx="1">
+            <a:schemeClr val="accent1"/>
+          </a:fillRef>
+          <a:effectRef idx="0">
+            <a:schemeClr val="accent1"/>
+          </a:effectRef>
+          <a:fontRef idx="minor">
+            <a:schemeClr val="lt1"/>
+          </a:fontRef>
+        </p:style>
+        <p:txBody>
+          <a:bodyPr rtlCol="0" anchor="ctr"/>
+          <a:lstStyle/>
+          <a:p>
+            <a:pPr algn="ctr"/>
+            <a:endParaRPr kumimoji="1" lang="ko-Kore-KR" altLang="en-US"/>
+          </a:p>
+        </p:txBody>
+      </p:sp>
       <p:pic>
         <p:nvPicPr>
-          <p:cNvPr id="2" name="그림 1">
-            <a:extLst>
-              <a:ext uri="{FF2B5EF4-FFF2-40B4-BE49-F238E27FC236}">
-                <a16:creationId xmlns:a16="http://schemas.microsoft.com/office/drawing/2014/main" id="{701DC65F-397A-FD48-96C1-EFAF10FED3C6}"/>
+          <p:cNvPr id="19" name="그림 18">
+            <a:extLst>
+              <a:ext uri="{FF2B5EF4-FFF2-40B4-BE49-F238E27FC236}">
+                <a16:creationId xmlns:a16="http://schemas.microsoft.com/office/drawing/2014/main" id="{E3492F54-9696-A743-8F2C-E465A2121746}"/>
               </a:ext>
             </a:extLst>
           </p:cNvPr>
@@ -3836,7 +4639,7 @@
         </p:blipFill>
         <p:spPr>
           <a:xfrm>
-            <a:off x="1435100" y="426616"/>
+            <a:off x="6834869" y="1376096"/>
             <a:ext cx="4660900" cy="1320800"/>
           </a:xfrm>
           <a:prstGeom prst="rect">
@@ -3847,7 +4650,7 @@
     </p:spTree>
     <p:extLst>
       <p:ext uri="{BB962C8B-B14F-4D97-AF65-F5344CB8AC3E}">
-        <p14:creationId xmlns:p14="http://schemas.microsoft.com/office/powerpoint/2010/main" val="4016943774"/>
+        <p14:creationId xmlns:p14="http://schemas.microsoft.com/office/powerpoint/2010/main" val="3881114177"/>
       </p:ext>
     </p:extLst>
   </p:cSld>
@@ -3874,10 +4677,702 @@
           <a:chExt cx="0" cy="0"/>
         </a:xfrm>
       </p:grpSpPr>
+      <p:pic>
+        <p:nvPicPr>
+          <p:cNvPr id="34" name="그림 33">
+            <a:extLst>
+              <a:ext uri="{FF2B5EF4-FFF2-40B4-BE49-F238E27FC236}">
+                <a16:creationId xmlns:a16="http://schemas.microsoft.com/office/drawing/2014/main" id="{5BF558FB-7CDB-0D42-8317-C0F2797BC6EE}"/>
+              </a:ext>
+            </a:extLst>
+          </p:cNvPr>
+          <p:cNvPicPr>
+            <a:picLocks noChangeAspect="1"/>
+          </p:cNvPicPr>
+          <p:nvPr/>
+        </p:nvPicPr>
+        <p:blipFill>
+          <a:blip r:embed="rId2"/>
+          <a:stretch>
+            <a:fillRect/>
+          </a:stretch>
+        </p:blipFill>
+        <p:spPr>
+          <a:xfrm>
+            <a:off x="34080" y="2672049"/>
+            <a:ext cx="4061634" cy="3359453"/>
+          </a:xfrm>
+          <a:prstGeom prst="rect">
+            <a:avLst/>
+          </a:prstGeom>
+        </p:spPr>
+      </p:pic>
+      <p:grpSp>
+        <p:nvGrpSpPr>
+          <p:cNvPr id="37" name="그룹 36">
+            <a:extLst>
+              <a:ext uri="{FF2B5EF4-FFF2-40B4-BE49-F238E27FC236}">
+                <a16:creationId xmlns:a16="http://schemas.microsoft.com/office/drawing/2014/main" id="{0FB18751-0075-C04F-8FBF-EA876088FB09}"/>
+              </a:ext>
+            </a:extLst>
+          </p:cNvPr>
+          <p:cNvGrpSpPr/>
+          <p:nvPr/>
+        </p:nvGrpSpPr>
+        <p:grpSpPr>
+          <a:xfrm>
+            <a:off x="4423428" y="1805892"/>
+            <a:ext cx="7531801" cy="3246216"/>
+            <a:chOff x="4861047" y="378036"/>
+            <a:chExt cx="7531801" cy="3246216"/>
+          </a:xfrm>
+        </p:grpSpPr>
+        <p:pic>
+          <p:nvPicPr>
+            <p:cNvPr id="8" name="그림 7">
+              <a:extLst>
+                <a:ext uri="{FF2B5EF4-FFF2-40B4-BE49-F238E27FC236}">
+                  <a16:creationId xmlns:a16="http://schemas.microsoft.com/office/drawing/2014/main" id="{0E6AAA33-4064-0346-B093-3AECE2C0AD9A}"/>
+                </a:ext>
+              </a:extLst>
+            </p:cNvPr>
+            <p:cNvPicPr>
+              <a:picLocks noChangeAspect="1"/>
+            </p:cNvPicPr>
+            <p:nvPr/>
+          </p:nvPicPr>
+          <p:blipFill rotWithShape="1">
+            <a:blip r:embed="rId3"/>
+            <a:srcRect l="5668"/>
+            <a:stretch/>
+          </p:blipFill>
+          <p:spPr>
+            <a:xfrm>
+              <a:off x="7772015" y="378036"/>
+              <a:ext cx="4543572" cy="866157"/>
+            </a:xfrm>
+            <a:prstGeom prst="rect">
+              <a:avLst/>
+            </a:prstGeom>
+            <a:ln w="6350">
+              <a:solidFill>
+                <a:schemeClr val="bg1">
+                  <a:lumMod val="85000"/>
+                </a:schemeClr>
+              </a:solidFill>
+            </a:ln>
+          </p:spPr>
+        </p:pic>
+        <p:grpSp>
+          <p:nvGrpSpPr>
+            <p:cNvPr id="24" name="그룹 23">
+              <a:extLst>
+                <a:ext uri="{FF2B5EF4-FFF2-40B4-BE49-F238E27FC236}">
+                  <a16:creationId xmlns:a16="http://schemas.microsoft.com/office/drawing/2014/main" id="{14D1FE05-94AC-134F-AF25-53B8AF0CA25D}"/>
+                </a:ext>
+              </a:extLst>
+            </p:cNvPr>
+            <p:cNvGrpSpPr/>
+            <p:nvPr/>
+          </p:nvGrpSpPr>
+          <p:grpSpPr>
+            <a:xfrm>
+              <a:off x="7772015" y="1838439"/>
+              <a:ext cx="4500946" cy="1785813"/>
+              <a:chOff x="6895094" y="3647337"/>
+              <a:chExt cx="4500946" cy="1785813"/>
+            </a:xfrm>
+          </p:grpSpPr>
+          <p:pic>
+            <p:nvPicPr>
+              <p:cNvPr id="10" name="그림 9">
+                <a:extLst>
+                  <a:ext uri="{FF2B5EF4-FFF2-40B4-BE49-F238E27FC236}">
+                    <a16:creationId xmlns:a16="http://schemas.microsoft.com/office/drawing/2014/main" id="{77205914-1631-5942-A918-46E0543A7165}"/>
+                  </a:ext>
+                </a:extLst>
+              </p:cNvPr>
+              <p:cNvPicPr>
+                <a:picLocks noChangeAspect="1"/>
+              </p:cNvPicPr>
+              <p:nvPr/>
+            </p:nvPicPr>
+            <p:blipFill rotWithShape="1">
+              <a:blip r:embed="rId4"/>
+              <a:srcRect l="6553"/>
+              <a:stretch/>
+            </p:blipFill>
+            <p:spPr>
+              <a:xfrm>
+                <a:off x="6895094" y="3647337"/>
+                <a:ext cx="4500946" cy="1785813"/>
+              </a:xfrm>
+              <a:prstGeom prst="rect">
+                <a:avLst/>
+              </a:prstGeom>
+              <a:ln w="6350">
+                <a:solidFill>
+                  <a:schemeClr val="bg1">
+                    <a:lumMod val="85000"/>
+                  </a:schemeClr>
+                </a:solidFill>
+              </a:ln>
+            </p:spPr>
+          </p:pic>
+          <p:pic>
+            <p:nvPicPr>
+              <p:cNvPr id="12" name="그림 11">
+                <a:extLst>
+                  <a:ext uri="{FF2B5EF4-FFF2-40B4-BE49-F238E27FC236}">
+                    <a16:creationId xmlns:a16="http://schemas.microsoft.com/office/drawing/2014/main" id="{A392BBF7-A4C8-CD4B-AA5F-C5422048CB50}"/>
+                  </a:ext>
+                </a:extLst>
+              </p:cNvPr>
+              <p:cNvPicPr>
+                <a:picLocks noChangeAspect="1"/>
+              </p:cNvPicPr>
+              <p:nvPr/>
+            </p:nvPicPr>
+            <p:blipFill>
+              <a:blip r:embed="rId5"/>
+              <a:stretch>
+                <a:fillRect/>
+              </a:stretch>
+            </p:blipFill>
+            <p:spPr>
+              <a:xfrm>
+                <a:off x="7186243" y="3992183"/>
+                <a:ext cx="3095232" cy="319395"/>
+              </a:xfrm>
+              <a:prstGeom prst="rect">
+                <a:avLst/>
+              </a:prstGeom>
+              <a:noFill/>
+              <a:ln w="28575">
+                <a:solidFill>
+                  <a:srgbClr val="FF0000"/>
+                </a:solidFill>
+              </a:ln>
+            </p:spPr>
+          </p:pic>
+          <p:pic>
+            <p:nvPicPr>
+              <p:cNvPr id="13" name="그림 12">
+                <a:extLst>
+                  <a:ext uri="{FF2B5EF4-FFF2-40B4-BE49-F238E27FC236}">
+                    <a16:creationId xmlns:a16="http://schemas.microsoft.com/office/drawing/2014/main" id="{825D813C-22DC-D74F-9D14-5913D51B9612}"/>
+                  </a:ext>
+                </a:extLst>
+              </p:cNvPr>
+              <p:cNvPicPr>
+                <a:picLocks noChangeAspect="1"/>
+              </p:cNvPicPr>
+              <p:nvPr/>
+            </p:nvPicPr>
+            <p:blipFill>
+              <a:blip r:embed="rId6"/>
+              <a:stretch>
+                <a:fillRect/>
+              </a:stretch>
+            </p:blipFill>
+            <p:spPr>
+              <a:xfrm>
+                <a:off x="7186243" y="4804490"/>
+                <a:ext cx="3313051" cy="319396"/>
+              </a:xfrm>
+              <a:prstGeom prst="rect">
+                <a:avLst/>
+              </a:prstGeom>
+              <a:noFill/>
+              <a:ln w="28575">
+                <a:solidFill>
+                  <a:srgbClr val="FF0000"/>
+                </a:solidFill>
+              </a:ln>
+            </p:spPr>
+          </p:pic>
+        </p:grpSp>
+        <p:sp>
+          <p:nvSpPr>
+            <p:cNvPr id="23" name="TextBox 22">
+              <a:extLst>
+                <a:ext uri="{FF2B5EF4-FFF2-40B4-BE49-F238E27FC236}">
+                  <a16:creationId xmlns:a16="http://schemas.microsoft.com/office/drawing/2014/main" id="{DE913B3A-CB1D-2C41-93D5-0D6ACAE39291}"/>
+                </a:ext>
+              </a:extLst>
+            </p:cNvPr>
+            <p:cNvSpPr txBox="1"/>
+            <p:nvPr/>
+          </p:nvSpPr>
+          <p:spPr>
+            <a:xfrm>
+              <a:off x="4912571" y="456755"/>
+              <a:ext cx="2422458" cy="704616"/>
+            </a:xfrm>
+            <a:prstGeom prst="rect">
+              <a:avLst/>
+            </a:prstGeom>
+            <a:noFill/>
+          </p:spPr>
+          <p:txBody>
+            <a:bodyPr wrap="none" rtlCol="0">
+              <a:spAutoFit/>
+            </a:bodyPr>
+            <a:lstStyle/>
+            <a:p>
+              <a:pPr>
+                <a:lnSpc>
+                  <a:spcPct val="130000"/>
+                </a:lnSpc>
+              </a:pPr>
+              <a:r>
+                <a:rPr kumimoji="1" lang="ko-KR" altLang="en-US" sz="1600" dirty="0"/>
+                <a:t>이 코드가 컴파일 후</a:t>
+              </a:r>
+              <a:endParaRPr kumimoji="1" lang="en-US" altLang="ko-KR" sz="1600" dirty="0"/>
+            </a:p>
+            <a:p>
+              <a:pPr>
+                <a:lnSpc>
+                  <a:spcPct val="130000"/>
+                </a:lnSpc>
+              </a:pPr>
+              <a:r>
+                <a:rPr kumimoji="1" lang="ko-KR" altLang="en-US" sz="1600" dirty="0"/>
+                <a:t>바이트 코드로 있지만 </a:t>
+              </a:r>
+              <a:r>
+                <a:rPr kumimoji="1" lang="en-US" altLang="ko-KR" sz="1600" dirty="0"/>
+                <a:t>=&gt;</a:t>
+              </a:r>
+              <a:r>
+                <a:rPr kumimoji="1" lang="ko-KR" altLang="en-US" sz="1600" dirty="0"/>
+                <a:t> </a:t>
+              </a:r>
+              <a:endParaRPr kumimoji="1" lang="ko-Kore-KR" altLang="en-US" sz="1600" dirty="0"/>
+            </a:p>
+          </p:txBody>
+        </p:sp>
+        <p:sp>
+          <p:nvSpPr>
+            <p:cNvPr id="25" name="TextBox 24">
+              <a:extLst>
+                <a:ext uri="{FF2B5EF4-FFF2-40B4-BE49-F238E27FC236}">
+                  <a16:creationId xmlns:a16="http://schemas.microsoft.com/office/drawing/2014/main" id="{BDD7E242-4200-0A40-B4EB-52494E0071E2}"/>
+                </a:ext>
+              </a:extLst>
+            </p:cNvPr>
+            <p:cNvSpPr txBox="1"/>
+            <p:nvPr/>
+          </p:nvSpPr>
+          <p:spPr>
+            <a:xfrm>
+              <a:off x="4861047" y="2238848"/>
+              <a:ext cx="2925801" cy="1346779"/>
+            </a:xfrm>
+            <a:prstGeom prst="rect">
+              <a:avLst/>
+            </a:prstGeom>
+            <a:noFill/>
+          </p:spPr>
+          <p:txBody>
+            <a:bodyPr wrap="none" rtlCol="0">
+              <a:spAutoFit/>
+            </a:bodyPr>
+            <a:lstStyle/>
+            <a:p>
+              <a:pPr>
+                <a:lnSpc>
+                  <a:spcPct val="130000"/>
+                </a:lnSpc>
+              </a:pPr>
+              <a:r>
+                <a:rPr kumimoji="1" lang="ko-KR" altLang="en-US" sz="1600" dirty="0"/>
+                <a:t>클래스 </a:t>
+              </a:r>
+              <a:r>
+                <a:rPr kumimoji="1" lang="ko-KR" altLang="en-US" sz="1600" dirty="0" err="1"/>
+                <a:t>로더가</a:t>
+              </a:r>
+              <a:r>
+                <a:rPr kumimoji="1" lang="ko-KR" altLang="en-US" sz="1600" dirty="0"/>
+                <a:t> </a:t>
+              </a:r>
+              <a:endParaRPr kumimoji="1" lang="en-US" altLang="ko-KR" sz="1600" dirty="0"/>
+            </a:p>
+            <a:p>
+              <a:pPr>
+                <a:lnSpc>
+                  <a:spcPct val="130000"/>
+                </a:lnSpc>
+              </a:pPr>
+              <a:r>
+                <a:rPr kumimoji="1" lang="ko-KR" altLang="en-US" sz="1600" dirty="0"/>
+                <a:t>클래스를 메모리에 올릴 때   </a:t>
+              </a:r>
+              <a:r>
+                <a:rPr kumimoji="1" lang="en-US" altLang="ko-KR" sz="1600" dirty="0"/>
+                <a:t>=&gt;</a:t>
+              </a:r>
+            </a:p>
+            <a:p>
+              <a:pPr>
+                <a:lnSpc>
+                  <a:spcPct val="130000"/>
+                </a:lnSpc>
+              </a:pPr>
+              <a:r>
+                <a:rPr kumimoji="1" lang="en-US" altLang="ko-KR" sz="1600" dirty="0"/>
+                <a:t>AspectJ</a:t>
+              </a:r>
+              <a:r>
+                <a:rPr kumimoji="1" lang="ko-KR" altLang="en-US" sz="1600" dirty="0"/>
+                <a:t>가 오른쪽처럼</a:t>
+              </a:r>
+              <a:endParaRPr kumimoji="1" lang="en-US" altLang="ko-KR" sz="1600" dirty="0"/>
+            </a:p>
+            <a:p>
+              <a:pPr>
+                <a:lnSpc>
+                  <a:spcPct val="130000"/>
+                </a:lnSpc>
+              </a:pPr>
+              <a:r>
+                <a:rPr kumimoji="1" lang="ko-KR" altLang="en-US" sz="1600" dirty="0" err="1"/>
+                <a:t>넣어줌</a:t>
+              </a:r>
+              <a:endParaRPr kumimoji="1" lang="en-US" altLang="ko-KR" sz="1600" dirty="0"/>
+            </a:p>
+          </p:txBody>
+        </p:sp>
+        <p:sp>
+          <p:nvSpPr>
+            <p:cNvPr id="35" name="TextBox 34">
+              <a:extLst>
+                <a:ext uri="{FF2B5EF4-FFF2-40B4-BE49-F238E27FC236}">
+                  <a16:creationId xmlns:a16="http://schemas.microsoft.com/office/drawing/2014/main" id="{BB19C941-C8A4-2645-9B50-A9723D675C74}"/>
+                </a:ext>
+              </a:extLst>
+            </p:cNvPr>
+            <p:cNvSpPr txBox="1"/>
+            <p:nvPr/>
+          </p:nvSpPr>
+          <p:spPr>
+            <a:xfrm>
+              <a:off x="11171039" y="2242066"/>
+              <a:ext cx="1221809" cy="276999"/>
+            </a:xfrm>
+            <a:prstGeom prst="rect">
+              <a:avLst/>
+            </a:prstGeom>
+            <a:noFill/>
+          </p:spPr>
+          <p:txBody>
+            <a:bodyPr wrap="none" rtlCol="0">
+              <a:spAutoFit/>
+            </a:bodyPr>
+            <a:lstStyle/>
+            <a:p>
+              <a:r>
+                <a:rPr kumimoji="1" lang="en-US" altLang="ko-KR" sz="1200" dirty="0">
+                  <a:solidFill>
+                    <a:srgbClr val="FF0000"/>
+                  </a:solidFill>
+                </a:rPr>
+                <a:t>(</a:t>
+              </a:r>
+              <a:r>
+                <a:rPr kumimoji="1" lang="en-US" altLang="ko-Kore-KR" sz="1200" dirty="0">
+                  <a:solidFill>
+                    <a:srgbClr val="FF0000"/>
+                  </a:solidFill>
+                </a:rPr>
+                <a:t>AspectJ</a:t>
+              </a:r>
+              <a:r>
+                <a:rPr kumimoji="1" lang="ko-KR" altLang="en-US" sz="1200" dirty="0">
+                  <a:solidFill>
+                    <a:srgbClr val="FF0000"/>
+                  </a:solidFill>
+                </a:rPr>
+                <a:t> </a:t>
+              </a:r>
+              <a:r>
+                <a:rPr kumimoji="1" lang="ko-KR" altLang="en-US" sz="1050" dirty="0">
+                  <a:solidFill>
+                    <a:srgbClr val="FF0000"/>
+                  </a:solidFill>
+                </a:rPr>
+                <a:t>가 추가</a:t>
+              </a:r>
+              <a:r>
+                <a:rPr kumimoji="1" lang="en-US" altLang="ko-KR" sz="1200" dirty="0">
+                  <a:solidFill>
+                    <a:srgbClr val="FF0000"/>
+                  </a:solidFill>
+                </a:rPr>
+                <a:t>)</a:t>
+              </a:r>
+              <a:endParaRPr kumimoji="1" lang="ko-Kore-KR" altLang="en-US" sz="1200" dirty="0">
+                <a:solidFill>
+                  <a:srgbClr val="FF0000"/>
+                </a:solidFill>
+              </a:endParaRPr>
+            </a:p>
+          </p:txBody>
+        </p:sp>
+        <p:sp>
+          <p:nvSpPr>
+            <p:cNvPr id="36" name="TextBox 35">
+              <a:extLst>
+                <a:ext uri="{FF2B5EF4-FFF2-40B4-BE49-F238E27FC236}">
+                  <a16:creationId xmlns:a16="http://schemas.microsoft.com/office/drawing/2014/main" id="{0C0F2244-5E85-E74F-9B36-E15B6082ADE1}"/>
+                </a:ext>
+              </a:extLst>
+            </p:cNvPr>
+            <p:cNvSpPr txBox="1"/>
+            <p:nvPr/>
+          </p:nvSpPr>
+          <p:spPr>
+            <a:xfrm>
+              <a:off x="11158396" y="3314988"/>
+              <a:ext cx="1221809" cy="276999"/>
+            </a:xfrm>
+            <a:prstGeom prst="rect">
+              <a:avLst/>
+            </a:prstGeom>
+            <a:noFill/>
+          </p:spPr>
+          <p:txBody>
+            <a:bodyPr wrap="none" rtlCol="0">
+              <a:spAutoFit/>
+            </a:bodyPr>
+            <a:lstStyle/>
+            <a:p>
+              <a:r>
+                <a:rPr kumimoji="1" lang="en-US" altLang="ko-KR" sz="1200" dirty="0">
+                  <a:solidFill>
+                    <a:srgbClr val="FF0000"/>
+                  </a:solidFill>
+                </a:rPr>
+                <a:t>(</a:t>
+              </a:r>
+              <a:r>
+                <a:rPr kumimoji="1" lang="en-US" altLang="ko-Kore-KR" sz="1200" dirty="0">
+                  <a:solidFill>
+                    <a:srgbClr val="FF0000"/>
+                  </a:solidFill>
+                </a:rPr>
+                <a:t>AspectJ</a:t>
+              </a:r>
+              <a:r>
+                <a:rPr kumimoji="1" lang="ko-KR" altLang="en-US" sz="1200" dirty="0">
+                  <a:solidFill>
+                    <a:srgbClr val="FF0000"/>
+                  </a:solidFill>
+                </a:rPr>
+                <a:t> </a:t>
+              </a:r>
+              <a:r>
+                <a:rPr kumimoji="1" lang="ko-KR" altLang="en-US" sz="1050" dirty="0">
+                  <a:solidFill>
+                    <a:srgbClr val="FF0000"/>
+                  </a:solidFill>
+                </a:rPr>
+                <a:t>가 추가</a:t>
+              </a:r>
+              <a:r>
+                <a:rPr kumimoji="1" lang="en-US" altLang="ko-KR" sz="1200" dirty="0">
+                  <a:solidFill>
+                    <a:srgbClr val="FF0000"/>
+                  </a:solidFill>
+                </a:rPr>
+                <a:t>)</a:t>
+              </a:r>
+              <a:endParaRPr kumimoji="1" lang="ko-Kore-KR" altLang="en-US" sz="1200" dirty="0">
+                <a:solidFill>
+                  <a:srgbClr val="FF0000"/>
+                </a:solidFill>
+              </a:endParaRPr>
+            </a:p>
+          </p:txBody>
+        </p:sp>
+      </p:grpSp>
+      <p:sp>
+        <p:nvSpPr>
+          <p:cNvPr id="38" name="직사각형 37">
+            <a:extLst>
+              <a:ext uri="{FF2B5EF4-FFF2-40B4-BE49-F238E27FC236}">
+                <a16:creationId xmlns:a16="http://schemas.microsoft.com/office/drawing/2014/main" id="{9282FEEF-D1CA-D34E-92A3-65C8B09E692C}"/>
+              </a:ext>
+            </a:extLst>
+          </p:cNvPr>
+          <p:cNvSpPr/>
+          <p:nvPr/>
+        </p:nvSpPr>
+        <p:spPr>
+          <a:xfrm>
+            <a:off x="4351283" y="1187669"/>
+            <a:ext cx="7662041" cy="4403834"/>
+          </a:xfrm>
+          <a:prstGeom prst="rect">
+            <a:avLst/>
+          </a:prstGeom>
+          <a:noFill/>
+          <a:ln>
+            <a:solidFill>
+              <a:schemeClr val="bg2">
+                <a:lumMod val="75000"/>
+              </a:schemeClr>
+            </a:solidFill>
+          </a:ln>
+        </p:spPr>
+        <p:style>
+          <a:lnRef idx="2">
+            <a:schemeClr val="accent1">
+              <a:shade val="50000"/>
+            </a:schemeClr>
+          </a:lnRef>
+          <a:fillRef idx="1">
+            <a:schemeClr val="accent1"/>
+          </a:fillRef>
+          <a:effectRef idx="0">
+            <a:schemeClr val="accent1"/>
+          </a:effectRef>
+          <a:fontRef idx="minor">
+            <a:schemeClr val="lt1"/>
+          </a:fontRef>
+        </p:style>
+        <p:txBody>
+          <a:bodyPr rtlCol="0" anchor="ctr"/>
+          <a:lstStyle/>
+          <a:p>
+            <a:pPr algn="ctr"/>
+            <a:endParaRPr kumimoji="1" lang="ko-Kore-KR" altLang="en-US"/>
+          </a:p>
+        </p:txBody>
+      </p:sp>
+      <p:cxnSp>
+        <p:nvCxnSpPr>
+          <p:cNvPr id="40" name="직선 화살표 연결선 39">
+            <a:extLst>
+              <a:ext uri="{FF2B5EF4-FFF2-40B4-BE49-F238E27FC236}">
+                <a16:creationId xmlns:a16="http://schemas.microsoft.com/office/drawing/2014/main" id="{5E85738A-30D8-7E46-BA59-AFB0778070E1}"/>
+              </a:ext>
+            </a:extLst>
+          </p:cNvPr>
+          <p:cNvCxnSpPr>
+            <a:cxnSpLocks/>
+          </p:cNvCxnSpPr>
+          <p:nvPr/>
+        </p:nvCxnSpPr>
+        <p:spPr>
+          <a:xfrm flipV="1">
+            <a:off x="1736877" y="3266296"/>
+            <a:ext cx="2540833" cy="1753547"/>
+          </a:xfrm>
+          <a:prstGeom prst="straightConnector1">
+            <a:avLst/>
+          </a:prstGeom>
+          <a:ln w="12700">
+            <a:solidFill>
+              <a:srgbClr val="FF0000"/>
+            </a:solidFill>
+            <a:tailEnd type="triangle"/>
+          </a:ln>
+        </p:spPr>
+        <p:style>
+          <a:lnRef idx="1">
+            <a:schemeClr val="accent1"/>
+          </a:lnRef>
+          <a:fillRef idx="0">
+            <a:schemeClr val="accent1"/>
+          </a:fillRef>
+          <a:effectRef idx="0">
+            <a:schemeClr val="accent1"/>
+          </a:effectRef>
+          <a:fontRef idx="minor">
+            <a:schemeClr val="tx1"/>
+          </a:fontRef>
+        </p:style>
+      </p:cxnSp>
+      <p:sp>
+        <p:nvSpPr>
+          <p:cNvPr id="41" name="TextBox 40">
+            <a:extLst>
+              <a:ext uri="{FF2B5EF4-FFF2-40B4-BE49-F238E27FC236}">
+                <a16:creationId xmlns:a16="http://schemas.microsoft.com/office/drawing/2014/main" id="{C6BF5697-A10D-9C4F-AB09-6FCF2B16941C}"/>
+              </a:ext>
+            </a:extLst>
+          </p:cNvPr>
+          <p:cNvSpPr txBox="1"/>
+          <p:nvPr/>
+        </p:nvSpPr>
+        <p:spPr>
+          <a:xfrm>
+            <a:off x="103169" y="256470"/>
+            <a:ext cx="4174541" cy="1140056"/>
+          </a:xfrm>
+          <a:prstGeom prst="rect">
+            <a:avLst/>
+          </a:prstGeom>
+          <a:noFill/>
+        </p:spPr>
+        <p:txBody>
+          <a:bodyPr wrap="none" rtlCol="0">
+            <a:spAutoFit/>
+          </a:bodyPr>
+          <a:lstStyle/>
+          <a:p>
+            <a:pPr>
+              <a:lnSpc>
+                <a:spcPct val="150000"/>
+              </a:lnSpc>
+            </a:pPr>
+            <a:r>
+              <a:rPr kumimoji="1" lang="ko-Kore-KR" altLang="en-US" sz="2400" dirty="0"/>
+              <a:t>클래스</a:t>
+            </a:r>
+            <a:r>
+              <a:rPr kumimoji="1" lang="ko-KR" altLang="en-US" sz="2400" dirty="0"/>
+              <a:t> </a:t>
+            </a:r>
+            <a:r>
+              <a:rPr kumimoji="1" lang="ko-KR" altLang="en-US" sz="2400" dirty="0" err="1"/>
+              <a:t>로더가</a:t>
+            </a:r>
+            <a:r>
+              <a:rPr kumimoji="1" lang="ko-KR" altLang="en-US" sz="2400" dirty="0"/>
+              <a:t> 클래스를 </a:t>
+            </a:r>
+            <a:endParaRPr kumimoji="1" lang="en-US" altLang="ko-KR" sz="2400" dirty="0"/>
+          </a:p>
+          <a:p>
+            <a:pPr>
+              <a:lnSpc>
+                <a:spcPct val="150000"/>
+              </a:lnSpc>
+            </a:pPr>
+            <a:r>
+              <a:rPr kumimoji="1" lang="ko-KR" altLang="en-US" sz="2400" dirty="0"/>
+              <a:t>메모리에 올릴 때 </a:t>
+            </a:r>
+            <a:r>
+              <a:rPr kumimoji="1" lang="en-US" altLang="ko-KR" sz="2400" dirty="0"/>
+              <a:t>AspectJ</a:t>
+            </a:r>
+            <a:r>
+              <a:rPr kumimoji="1" lang="ko-KR" altLang="en-US" sz="2400" dirty="0"/>
+              <a:t> 등장</a:t>
+            </a:r>
+            <a:endParaRPr kumimoji="1" lang="ko-Kore-KR" altLang="en-US" sz="2400" dirty="0"/>
+          </a:p>
+        </p:txBody>
+      </p:sp>
     </p:spTree>
     <p:extLst>
       <p:ext uri="{BB962C8B-B14F-4D97-AF65-F5344CB8AC3E}">
-        <p14:creationId xmlns:p14="http://schemas.microsoft.com/office/powerpoint/2010/main" val="3881114177"/>
+        <p14:creationId xmlns:p14="http://schemas.microsoft.com/office/powerpoint/2010/main" val="4016943774"/>
       </p:ext>
     </p:extLst>
   </p:cSld>
@@ -3888,6 +5383,685 @@
 </file>
 
 <file path=ppt/slides/slide4.xml><?xml version="1.0" encoding="utf-8"?>
+<p:sld xmlns:a="http://schemas.openxmlformats.org/drawingml/2006/main" xmlns:r="http://schemas.openxmlformats.org/officeDocument/2006/relationships" xmlns:p="http://schemas.openxmlformats.org/presentationml/2006/main">
+  <p:cSld>
+    <p:spTree>
+      <p:nvGrpSpPr>
+        <p:cNvPr id="1" name=""/>
+        <p:cNvGrpSpPr/>
+        <p:nvPr/>
+      </p:nvGrpSpPr>
+      <p:grpSpPr>
+        <a:xfrm>
+          <a:off x="0" y="0"/>
+          <a:ext cx="0" cy="0"/>
+          <a:chOff x="0" y="0"/>
+          <a:chExt cx="0" cy="0"/>
+        </a:xfrm>
+      </p:grpSpPr>
+      <p:pic>
+        <p:nvPicPr>
+          <p:cNvPr id="34" name="그림 33">
+            <a:extLst>
+              <a:ext uri="{FF2B5EF4-FFF2-40B4-BE49-F238E27FC236}">
+                <a16:creationId xmlns:a16="http://schemas.microsoft.com/office/drawing/2014/main" id="{5BF558FB-7CDB-0D42-8317-C0F2797BC6EE}"/>
+              </a:ext>
+            </a:extLst>
+          </p:cNvPr>
+          <p:cNvPicPr>
+            <a:picLocks noChangeAspect="1"/>
+          </p:cNvPicPr>
+          <p:nvPr/>
+        </p:nvPicPr>
+        <p:blipFill>
+          <a:blip r:embed="rId2"/>
+          <a:stretch>
+            <a:fillRect/>
+          </a:stretch>
+        </p:blipFill>
+        <p:spPr>
+          <a:xfrm>
+            <a:off x="34080" y="2672049"/>
+            <a:ext cx="4061634" cy="3359453"/>
+          </a:xfrm>
+          <a:prstGeom prst="rect">
+            <a:avLst/>
+          </a:prstGeom>
+        </p:spPr>
+      </p:pic>
+      <p:grpSp>
+        <p:nvGrpSpPr>
+          <p:cNvPr id="37" name="그룹 36">
+            <a:extLst>
+              <a:ext uri="{FF2B5EF4-FFF2-40B4-BE49-F238E27FC236}">
+                <a16:creationId xmlns:a16="http://schemas.microsoft.com/office/drawing/2014/main" id="{0FB18751-0075-C04F-8FBF-EA876088FB09}"/>
+              </a:ext>
+            </a:extLst>
+          </p:cNvPr>
+          <p:cNvGrpSpPr/>
+          <p:nvPr/>
+        </p:nvGrpSpPr>
+        <p:grpSpPr>
+          <a:xfrm>
+            <a:off x="4580023" y="1805892"/>
+            <a:ext cx="6891733" cy="3246216"/>
+            <a:chOff x="5017642" y="378036"/>
+            <a:chExt cx="6891733" cy="3246216"/>
+          </a:xfrm>
+        </p:grpSpPr>
+        <p:pic>
+          <p:nvPicPr>
+            <p:cNvPr id="8" name="그림 7">
+              <a:extLst>
+                <a:ext uri="{FF2B5EF4-FFF2-40B4-BE49-F238E27FC236}">
+                  <a16:creationId xmlns:a16="http://schemas.microsoft.com/office/drawing/2014/main" id="{0E6AAA33-4064-0346-B093-3AECE2C0AD9A}"/>
+                </a:ext>
+              </a:extLst>
+            </p:cNvPr>
+            <p:cNvPicPr>
+              <a:picLocks noChangeAspect="1"/>
+            </p:cNvPicPr>
+            <p:nvPr/>
+          </p:nvPicPr>
+          <p:blipFill rotWithShape="1">
+            <a:blip r:embed="rId3"/>
+            <a:srcRect l="5668"/>
+            <a:stretch/>
+          </p:blipFill>
+          <p:spPr>
+            <a:xfrm>
+              <a:off x="7288542" y="378036"/>
+              <a:ext cx="4543572" cy="866157"/>
+            </a:xfrm>
+            <a:prstGeom prst="rect">
+              <a:avLst/>
+            </a:prstGeom>
+            <a:ln w="6350">
+              <a:solidFill>
+                <a:schemeClr val="bg1">
+                  <a:lumMod val="85000"/>
+                </a:schemeClr>
+              </a:solidFill>
+            </a:ln>
+          </p:spPr>
+        </p:pic>
+        <p:grpSp>
+          <p:nvGrpSpPr>
+            <p:cNvPr id="24" name="그룹 23">
+              <a:extLst>
+                <a:ext uri="{FF2B5EF4-FFF2-40B4-BE49-F238E27FC236}">
+                  <a16:creationId xmlns:a16="http://schemas.microsoft.com/office/drawing/2014/main" id="{14D1FE05-94AC-134F-AF25-53B8AF0CA25D}"/>
+                </a:ext>
+              </a:extLst>
+            </p:cNvPr>
+            <p:cNvGrpSpPr/>
+            <p:nvPr/>
+          </p:nvGrpSpPr>
+          <p:grpSpPr>
+            <a:xfrm>
+              <a:off x="7288542" y="1838439"/>
+              <a:ext cx="4500946" cy="1785813"/>
+              <a:chOff x="6411621" y="3647337"/>
+              <a:chExt cx="4500946" cy="1785813"/>
+            </a:xfrm>
+          </p:grpSpPr>
+          <p:pic>
+            <p:nvPicPr>
+              <p:cNvPr id="10" name="그림 9">
+                <a:extLst>
+                  <a:ext uri="{FF2B5EF4-FFF2-40B4-BE49-F238E27FC236}">
+                    <a16:creationId xmlns:a16="http://schemas.microsoft.com/office/drawing/2014/main" id="{77205914-1631-5942-A918-46E0543A7165}"/>
+                  </a:ext>
+                </a:extLst>
+              </p:cNvPr>
+              <p:cNvPicPr>
+                <a:picLocks noChangeAspect="1"/>
+              </p:cNvPicPr>
+              <p:nvPr/>
+            </p:nvPicPr>
+            <p:blipFill rotWithShape="1">
+              <a:blip r:embed="rId4"/>
+              <a:srcRect l="6553"/>
+              <a:stretch/>
+            </p:blipFill>
+            <p:spPr>
+              <a:xfrm>
+                <a:off x="6411621" y="3647337"/>
+                <a:ext cx="4500946" cy="1785813"/>
+              </a:xfrm>
+              <a:prstGeom prst="rect">
+                <a:avLst/>
+              </a:prstGeom>
+              <a:ln w="6350">
+                <a:solidFill>
+                  <a:schemeClr val="bg1">
+                    <a:lumMod val="85000"/>
+                  </a:schemeClr>
+                </a:solidFill>
+              </a:ln>
+            </p:spPr>
+          </p:pic>
+          <p:pic>
+            <p:nvPicPr>
+              <p:cNvPr id="12" name="그림 11">
+                <a:extLst>
+                  <a:ext uri="{FF2B5EF4-FFF2-40B4-BE49-F238E27FC236}">
+                    <a16:creationId xmlns:a16="http://schemas.microsoft.com/office/drawing/2014/main" id="{A392BBF7-A4C8-CD4B-AA5F-C5422048CB50}"/>
+                  </a:ext>
+                </a:extLst>
+              </p:cNvPr>
+              <p:cNvPicPr>
+                <a:picLocks noChangeAspect="1"/>
+              </p:cNvPicPr>
+              <p:nvPr/>
+            </p:nvPicPr>
+            <p:blipFill>
+              <a:blip r:embed="rId5"/>
+              <a:stretch>
+                <a:fillRect/>
+              </a:stretch>
+            </p:blipFill>
+            <p:spPr>
+              <a:xfrm>
+                <a:off x="6702770" y="3992183"/>
+                <a:ext cx="3095232" cy="319395"/>
+              </a:xfrm>
+              <a:prstGeom prst="rect">
+                <a:avLst/>
+              </a:prstGeom>
+              <a:noFill/>
+              <a:ln w="28575">
+                <a:solidFill>
+                  <a:srgbClr val="FF0000"/>
+                </a:solidFill>
+              </a:ln>
+            </p:spPr>
+          </p:pic>
+          <p:pic>
+            <p:nvPicPr>
+              <p:cNvPr id="13" name="그림 12">
+                <a:extLst>
+                  <a:ext uri="{FF2B5EF4-FFF2-40B4-BE49-F238E27FC236}">
+                    <a16:creationId xmlns:a16="http://schemas.microsoft.com/office/drawing/2014/main" id="{825D813C-22DC-D74F-9D14-5913D51B9612}"/>
+                  </a:ext>
+                </a:extLst>
+              </p:cNvPr>
+              <p:cNvPicPr>
+                <a:picLocks noChangeAspect="1"/>
+              </p:cNvPicPr>
+              <p:nvPr/>
+            </p:nvPicPr>
+            <p:blipFill>
+              <a:blip r:embed="rId6"/>
+              <a:stretch>
+                <a:fillRect/>
+              </a:stretch>
+            </p:blipFill>
+            <p:spPr>
+              <a:xfrm>
+                <a:off x="6702770" y="4804490"/>
+                <a:ext cx="3313051" cy="319396"/>
+              </a:xfrm>
+              <a:prstGeom prst="rect">
+                <a:avLst/>
+              </a:prstGeom>
+              <a:noFill/>
+              <a:ln w="28575">
+                <a:solidFill>
+                  <a:srgbClr val="FF0000"/>
+                </a:solidFill>
+              </a:ln>
+            </p:spPr>
+          </p:pic>
+        </p:grpSp>
+        <p:sp>
+          <p:nvSpPr>
+            <p:cNvPr id="23" name="TextBox 22">
+              <a:extLst>
+                <a:ext uri="{FF2B5EF4-FFF2-40B4-BE49-F238E27FC236}">
+                  <a16:creationId xmlns:a16="http://schemas.microsoft.com/office/drawing/2014/main" id="{DE913B3A-CB1D-2C41-93D5-0D6ACAE39291}"/>
+                </a:ext>
+              </a:extLst>
+            </p:cNvPr>
+            <p:cNvSpPr txBox="1"/>
+            <p:nvPr/>
+          </p:nvSpPr>
+          <p:spPr>
+            <a:xfrm>
+              <a:off x="5180347" y="517868"/>
+              <a:ext cx="1760418" cy="704616"/>
+            </a:xfrm>
+            <a:prstGeom prst="rect">
+              <a:avLst/>
+            </a:prstGeom>
+            <a:noFill/>
+          </p:spPr>
+          <p:txBody>
+            <a:bodyPr wrap="none" rtlCol="0">
+              <a:spAutoFit/>
+            </a:bodyPr>
+            <a:lstStyle/>
+            <a:p>
+              <a:pPr>
+                <a:lnSpc>
+                  <a:spcPct val="130000"/>
+                </a:lnSpc>
+              </a:pPr>
+              <a:r>
+                <a:rPr kumimoji="1" lang="ko-KR" altLang="en-US" sz="1600" dirty="0"/>
+                <a:t>이렇게 써서 </a:t>
+              </a:r>
+              <a:endParaRPr kumimoji="1" lang="en-US" altLang="ko-KR" sz="1600" dirty="0"/>
+            </a:p>
+            <a:p>
+              <a:pPr>
+                <a:lnSpc>
+                  <a:spcPct val="130000"/>
+                </a:lnSpc>
+              </a:pPr>
+              <a:r>
+                <a:rPr kumimoji="1" lang="ko-KR" altLang="en-US" sz="1600" dirty="0"/>
+                <a:t>컴파일 눌러도 </a:t>
+              </a:r>
+              <a:r>
+                <a:rPr kumimoji="1" lang="en-US" altLang="ko-KR" sz="1600" dirty="0"/>
+                <a:t>=&gt;</a:t>
+              </a:r>
+              <a:r>
+                <a:rPr kumimoji="1" lang="ko-KR" altLang="en-US" sz="1600" dirty="0"/>
+                <a:t> </a:t>
+              </a:r>
+              <a:endParaRPr kumimoji="1" lang="ko-Kore-KR" altLang="en-US" sz="1600" dirty="0"/>
+            </a:p>
+          </p:txBody>
+        </p:sp>
+        <p:sp>
+          <p:nvSpPr>
+            <p:cNvPr id="25" name="TextBox 24">
+              <a:extLst>
+                <a:ext uri="{FF2B5EF4-FFF2-40B4-BE49-F238E27FC236}">
+                  <a16:creationId xmlns:a16="http://schemas.microsoft.com/office/drawing/2014/main" id="{BDD7E242-4200-0A40-B4EB-52494E0071E2}"/>
+                </a:ext>
+              </a:extLst>
+            </p:cNvPr>
+            <p:cNvSpPr txBox="1"/>
+            <p:nvPr/>
+          </p:nvSpPr>
+          <p:spPr>
+            <a:xfrm>
+              <a:off x="5017642" y="2228005"/>
+              <a:ext cx="2085827" cy="1061253"/>
+            </a:xfrm>
+            <a:prstGeom prst="rect">
+              <a:avLst/>
+            </a:prstGeom>
+            <a:noFill/>
+          </p:spPr>
+          <p:txBody>
+            <a:bodyPr wrap="none" rtlCol="0">
+              <a:spAutoFit/>
+            </a:bodyPr>
+            <a:lstStyle/>
+            <a:p>
+              <a:pPr>
+                <a:lnSpc>
+                  <a:spcPct val="130000"/>
+                </a:lnSpc>
+              </a:pPr>
+              <a:r>
+                <a:rPr kumimoji="1" lang="en-US" altLang="ko-Kore-KR" sz="1600" dirty="0"/>
+                <a:t>AspectJ</a:t>
+              </a:r>
+              <a:r>
+                <a:rPr kumimoji="1" lang="ko-KR" altLang="en-US" sz="1600" dirty="0"/>
+                <a:t>가</a:t>
+              </a:r>
+              <a:endParaRPr kumimoji="1" lang="en-US" altLang="ko-Kore-KR" sz="1600" dirty="0"/>
+            </a:p>
+            <a:p>
+              <a:pPr>
+                <a:lnSpc>
+                  <a:spcPct val="130000"/>
+                </a:lnSpc>
+              </a:pPr>
+              <a:r>
+                <a:rPr kumimoji="1" lang="ko-Kore-KR" altLang="en-US" sz="1600" dirty="0"/>
+                <a:t>이렇게</a:t>
+              </a:r>
+              <a:r>
+                <a:rPr kumimoji="1" lang="ko-KR" altLang="en-US" sz="1600" dirty="0"/>
+                <a:t> 있다고         </a:t>
+              </a:r>
+              <a:r>
+                <a:rPr kumimoji="1" lang="en-US" altLang="ko-KR" sz="1600" dirty="0"/>
+                <a:t>=&gt;</a:t>
+              </a:r>
+            </a:p>
+            <a:p>
+              <a:pPr>
+                <a:lnSpc>
+                  <a:spcPct val="130000"/>
+                </a:lnSpc>
+              </a:pPr>
+              <a:r>
+                <a:rPr kumimoji="1" lang="ko-KR" altLang="en-US" sz="1600" dirty="0"/>
+                <a:t>생각하고 컴파일함</a:t>
+              </a:r>
+              <a:endParaRPr kumimoji="1" lang="ko-Kore-KR" altLang="en-US" sz="1600" dirty="0"/>
+            </a:p>
+          </p:txBody>
+        </p:sp>
+        <p:sp>
+          <p:nvSpPr>
+            <p:cNvPr id="35" name="TextBox 34">
+              <a:extLst>
+                <a:ext uri="{FF2B5EF4-FFF2-40B4-BE49-F238E27FC236}">
+                  <a16:creationId xmlns:a16="http://schemas.microsoft.com/office/drawing/2014/main" id="{BB19C941-C8A4-2645-9B50-A9723D675C74}"/>
+                </a:ext>
+              </a:extLst>
+            </p:cNvPr>
+            <p:cNvSpPr txBox="1"/>
+            <p:nvPr/>
+          </p:nvSpPr>
+          <p:spPr>
+            <a:xfrm>
+              <a:off x="10687566" y="2242066"/>
+              <a:ext cx="1221809" cy="276999"/>
+            </a:xfrm>
+            <a:prstGeom prst="rect">
+              <a:avLst/>
+            </a:prstGeom>
+            <a:noFill/>
+          </p:spPr>
+          <p:txBody>
+            <a:bodyPr wrap="none" rtlCol="0">
+              <a:spAutoFit/>
+            </a:bodyPr>
+            <a:lstStyle/>
+            <a:p>
+              <a:r>
+                <a:rPr kumimoji="1" lang="en-US" altLang="ko-KR" sz="1200" dirty="0">
+                  <a:solidFill>
+                    <a:srgbClr val="FF0000"/>
+                  </a:solidFill>
+                </a:rPr>
+                <a:t>(</a:t>
+              </a:r>
+              <a:r>
+                <a:rPr kumimoji="1" lang="en-US" altLang="ko-Kore-KR" sz="1200" dirty="0">
+                  <a:solidFill>
+                    <a:srgbClr val="FF0000"/>
+                  </a:solidFill>
+                </a:rPr>
+                <a:t>AspectJ</a:t>
+              </a:r>
+              <a:r>
+                <a:rPr kumimoji="1" lang="ko-KR" altLang="en-US" sz="1200" dirty="0">
+                  <a:solidFill>
+                    <a:srgbClr val="FF0000"/>
+                  </a:solidFill>
+                </a:rPr>
+                <a:t> </a:t>
+              </a:r>
+              <a:r>
+                <a:rPr kumimoji="1" lang="ko-KR" altLang="en-US" sz="1050" dirty="0">
+                  <a:solidFill>
+                    <a:srgbClr val="FF0000"/>
+                  </a:solidFill>
+                </a:rPr>
+                <a:t>가 추가</a:t>
+              </a:r>
+              <a:r>
+                <a:rPr kumimoji="1" lang="en-US" altLang="ko-KR" sz="1200" dirty="0">
+                  <a:solidFill>
+                    <a:srgbClr val="FF0000"/>
+                  </a:solidFill>
+                </a:rPr>
+                <a:t>)</a:t>
+              </a:r>
+              <a:endParaRPr kumimoji="1" lang="ko-Kore-KR" altLang="en-US" sz="1200" dirty="0">
+                <a:solidFill>
+                  <a:srgbClr val="FF0000"/>
+                </a:solidFill>
+              </a:endParaRPr>
+            </a:p>
+          </p:txBody>
+        </p:sp>
+        <p:sp>
+          <p:nvSpPr>
+            <p:cNvPr id="36" name="TextBox 35">
+              <a:extLst>
+                <a:ext uri="{FF2B5EF4-FFF2-40B4-BE49-F238E27FC236}">
+                  <a16:creationId xmlns:a16="http://schemas.microsoft.com/office/drawing/2014/main" id="{0C0F2244-5E85-E74F-9B36-E15B6082ADE1}"/>
+                </a:ext>
+              </a:extLst>
+            </p:cNvPr>
+            <p:cNvSpPr txBox="1"/>
+            <p:nvPr/>
+          </p:nvSpPr>
+          <p:spPr>
+            <a:xfrm>
+              <a:off x="10674923" y="3314988"/>
+              <a:ext cx="1221809" cy="276999"/>
+            </a:xfrm>
+            <a:prstGeom prst="rect">
+              <a:avLst/>
+            </a:prstGeom>
+            <a:noFill/>
+          </p:spPr>
+          <p:txBody>
+            <a:bodyPr wrap="none" rtlCol="0">
+              <a:spAutoFit/>
+            </a:bodyPr>
+            <a:lstStyle/>
+            <a:p>
+              <a:r>
+                <a:rPr kumimoji="1" lang="en-US" altLang="ko-KR" sz="1200" dirty="0">
+                  <a:solidFill>
+                    <a:srgbClr val="FF0000"/>
+                  </a:solidFill>
+                </a:rPr>
+                <a:t>(</a:t>
+              </a:r>
+              <a:r>
+                <a:rPr kumimoji="1" lang="en-US" altLang="ko-Kore-KR" sz="1200" dirty="0">
+                  <a:solidFill>
+                    <a:srgbClr val="FF0000"/>
+                  </a:solidFill>
+                </a:rPr>
+                <a:t>AspectJ</a:t>
+              </a:r>
+              <a:r>
+                <a:rPr kumimoji="1" lang="ko-KR" altLang="en-US" sz="1200" dirty="0">
+                  <a:solidFill>
+                    <a:srgbClr val="FF0000"/>
+                  </a:solidFill>
+                </a:rPr>
+                <a:t> </a:t>
+              </a:r>
+              <a:r>
+                <a:rPr kumimoji="1" lang="ko-KR" altLang="en-US" sz="1050" dirty="0">
+                  <a:solidFill>
+                    <a:srgbClr val="FF0000"/>
+                  </a:solidFill>
+                </a:rPr>
+                <a:t>가 추가</a:t>
+              </a:r>
+              <a:r>
+                <a:rPr kumimoji="1" lang="en-US" altLang="ko-KR" sz="1200" dirty="0">
+                  <a:solidFill>
+                    <a:srgbClr val="FF0000"/>
+                  </a:solidFill>
+                </a:rPr>
+                <a:t>)</a:t>
+              </a:r>
+              <a:endParaRPr kumimoji="1" lang="ko-Kore-KR" altLang="en-US" sz="1200" dirty="0">
+                <a:solidFill>
+                  <a:srgbClr val="FF0000"/>
+                </a:solidFill>
+              </a:endParaRPr>
+            </a:p>
+          </p:txBody>
+        </p:sp>
+      </p:grpSp>
+      <p:sp>
+        <p:nvSpPr>
+          <p:cNvPr id="38" name="직사각형 37">
+            <a:extLst>
+              <a:ext uri="{FF2B5EF4-FFF2-40B4-BE49-F238E27FC236}">
+                <a16:creationId xmlns:a16="http://schemas.microsoft.com/office/drawing/2014/main" id="{9282FEEF-D1CA-D34E-92A3-65C8B09E692C}"/>
+              </a:ext>
+            </a:extLst>
+          </p:cNvPr>
+          <p:cNvSpPr/>
+          <p:nvPr/>
+        </p:nvSpPr>
+        <p:spPr>
+          <a:xfrm>
+            <a:off x="4351283" y="1187669"/>
+            <a:ext cx="7483365" cy="4403834"/>
+          </a:xfrm>
+          <a:prstGeom prst="rect">
+            <a:avLst/>
+          </a:prstGeom>
+          <a:noFill/>
+          <a:ln>
+            <a:solidFill>
+              <a:schemeClr val="bg2">
+                <a:lumMod val="75000"/>
+              </a:schemeClr>
+            </a:solidFill>
+          </a:ln>
+        </p:spPr>
+        <p:style>
+          <a:lnRef idx="2">
+            <a:schemeClr val="accent1">
+              <a:shade val="50000"/>
+            </a:schemeClr>
+          </a:lnRef>
+          <a:fillRef idx="1">
+            <a:schemeClr val="accent1"/>
+          </a:fillRef>
+          <a:effectRef idx="0">
+            <a:schemeClr val="accent1"/>
+          </a:effectRef>
+          <a:fontRef idx="minor">
+            <a:schemeClr val="lt1"/>
+          </a:fontRef>
+        </p:style>
+        <p:txBody>
+          <a:bodyPr rtlCol="0" anchor="ctr"/>
+          <a:lstStyle/>
+          <a:p>
+            <a:pPr algn="ctr"/>
+            <a:endParaRPr kumimoji="1" lang="ko-Kore-KR" altLang="en-US"/>
+          </a:p>
+        </p:txBody>
+      </p:sp>
+      <p:cxnSp>
+        <p:nvCxnSpPr>
+          <p:cNvPr id="40" name="직선 화살표 연결선 39">
+            <a:extLst>
+              <a:ext uri="{FF2B5EF4-FFF2-40B4-BE49-F238E27FC236}">
+                <a16:creationId xmlns:a16="http://schemas.microsoft.com/office/drawing/2014/main" id="{5E85738A-30D8-7E46-BA59-AFB0778070E1}"/>
+              </a:ext>
+            </a:extLst>
+          </p:cNvPr>
+          <p:cNvCxnSpPr/>
+          <p:nvPr/>
+        </p:nvCxnSpPr>
+        <p:spPr>
+          <a:xfrm>
+            <a:off x="3069021" y="3429000"/>
+            <a:ext cx="1208689" cy="0"/>
+          </a:xfrm>
+          <a:prstGeom prst="straightConnector1">
+            <a:avLst/>
+          </a:prstGeom>
+          <a:ln w="12700">
+            <a:solidFill>
+              <a:srgbClr val="FF0000"/>
+            </a:solidFill>
+            <a:tailEnd type="triangle"/>
+          </a:ln>
+        </p:spPr>
+        <p:style>
+          <a:lnRef idx="1">
+            <a:schemeClr val="accent1"/>
+          </a:lnRef>
+          <a:fillRef idx="0">
+            <a:schemeClr val="accent1"/>
+          </a:fillRef>
+          <a:effectRef idx="0">
+            <a:schemeClr val="accent1"/>
+          </a:effectRef>
+          <a:fontRef idx="minor">
+            <a:schemeClr val="tx1"/>
+          </a:fontRef>
+        </p:style>
+      </p:cxnSp>
+      <p:sp>
+        <p:nvSpPr>
+          <p:cNvPr id="41" name="TextBox 40">
+            <a:extLst>
+              <a:ext uri="{FF2B5EF4-FFF2-40B4-BE49-F238E27FC236}">
+                <a16:creationId xmlns:a16="http://schemas.microsoft.com/office/drawing/2014/main" id="{C6BF5697-A10D-9C4F-AB09-6FCF2B16941C}"/>
+              </a:ext>
+            </a:extLst>
+          </p:cNvPr>
+          <p:cNvSpPr txBox="1"/>
+          <p:nvPr/>
+        </p:nvSpPr>
+        <p:spPr>
+          <a:xfrm>
+            <a:off x="245672" y="595665"/>
+            <a:ext cx="4105611" cy="461665"/>
+          </a:xfrm>
+          <a:prstGeom prst="rect">
+            <a:avLst/>
+          </a:prstGeom>
+          <a:noFill/>
+        </p:spPr>
+        <p:txBody>
+          <a:bodyPr wrap="none" rtlCol="0">
+            <a:spAutoFit/>
+          </a:bodyPr>
+          <a:lstStyle/>
+          <a:p>
+            <a:r>
+              <a:rPr kumimoji="1" lang="ko-Kore-KR" altLang="en-US" sz="2400" dirty="0"/>
+              <a:t>컴파일</a:t>
+            </a:r>
+            <a:r>
+              <a:rPr kumimoji="1" lang="ko-KR" altLang="en-US" sz="2400" dirty="0"/>
+              <a:t> 단계에서 </a:t>
+            </a:r>
+            <a:r>
+              <a:rPr kumimoji="1" lang="en-US" altLang="ko-KR" sz="2400" dirty="0"/>
+              <a:t>AspectJ</a:t>
+            </a:r>
+            <a:r>
+              <a:rPr kumimoji="1" lang="ko-KR" altLang="en-US" sz="2400" dirty="0"/>
+              <a:t> 등장</a:t>
+            </a:r>
+            <a:endParaRPr kumimoji="1" lang="ko-Kore-KR" altLang="en-US" sz="2400" dirty="0"/>
+          </a:p>
+        </p:txBody>
+      </p:sp>
+    </p:spTree>
+    <p:extLst>
+      <p:ext uri="{BB962C8B-B14F-4D97-AF65-F5344CB8AC3E}">
+        <p14:creationId xmlns:p14="http://schemas.microsoft.com/office/powerpoint/2010/main" val="3589989584"/>
+      </p:ext>
+    </p:extLst>
+  </p:cSld>
+  <p:clrMapOvr>
+    <a:masterClrMapping/>
+  </p:clrMapOvr>
+</p:sld>
+</file>
+
+<file path=ppt/slides/slide5.xml><?xml version="1.0" encoding="utf-8"?>
 <p:sld xmlns:a="http://schemas.openxmlformats.org/drawingml/2006/main" xmlns:r="http://schemas.openxmlformats.org/officeDocument/2006/relationships" xmlns:p="http://schemas.openxmlformats.org/presentationml/2006/main">
   <p:cSld>
     <p:spTree>
@@ -3917,7 +6091,7 @@
 </p:sld>
 </file>
 
-<file path=ppt/slides/slide5.xml><?xml version="1.0" encoding="utf-8"?>
+<file path=ppt/slides/slide6.xml><?xml version="1.0" encoding="utf-8"?>
 <p:sld xmlns:a="http://schemas.openxmlformats.org/drawingml/2006/main" xmlns:r="http://schemas.openxmlformats.org/officeDocument/2006/relationships" xmlns:p="http://schemas.openxmlformats.org/presentationml/2006/main">
   <p:cSld>
     <p:spTree>
@@ -3947,7 +6121,7 @@
 </p:sld>
 </file>
 
-<file path=ppt/slides/slide6.xml><?xml version="1.0" encoding="utf-8"?>
+<file path=ppt/slides/slide7.xml><?xml version="1.0" encoding="utf-8"?>
 <p:sld xmlns:a="http://schemas.openxmlformats.org/drawingml/2006/main" xmlns:r="http://schemas.openxmlformats.org/officeDocument/2006/relationships" xmlns:p="http://schemas.openxmlformats.org/presentationml/2006/main">
   <p:cSld>
     <p:spTree>
@@ -3977,7 +6151,7 @@
 </p:sld>
 </file>
 
-<file path=ppt/slides/slide7.xml><?xml version="1.0" encoding="utf-8"?>
+<file path=ppt/slides/slide8.xml><?xml version="1.0" encoding="utf-8"?>
 <p:sld xmlns:a="http://schemas.openxmlformats.org/drawingml/2006/main" xmlns:r="http://schemas.openxmlformats.org/officeDocument/2006/relationships" xmlns:p="http://schemas.openxmlformats.org/presentationml/2006/main">
   <p:cSld>
     <p:spTree>
@@ -4007,7 +6181,7 @@
 </p:sld>
 </file>
 
-<file path=ppt/slides/slide8.xml><?xml version="1.0" encoding="utf-8"?>
+<file path=ppt/slides/slide9.xml><?xml version="1.0" encoding="utf-8"?>
 <p:sld xmlns:a="http://schemas.openxmlformats.org/drawingml/2006/main" xmlns:r="http://schemas.openxmlformats.org/officeDocument/2006/relationships" xmlns:p="http://schemas.openxmlformats.org/presentationml/2006/main">
   <p:cSld>
     <p:spTree>
@@ -4028,36 +6202,6 @@
     <p:extLst>
       <p:ext uri="{BB962C8B-B14F-4D97-AF65-F5344CB8AC3E}">
         <p14:creationId xmlns:p14="http://schemas.microsoft.com/office/powerpoint/2010/main" val="1163592733"/>
-      </p:ext>
-    </p:extLst>
-  </p:cSld>
-  <p:clrMapOvr>
-    <a:masterClrMapping/>
-  </p:clrMapOvr>
-</p:sld>
-</file>
-
-<file path=ppt/slides/slide9.xml><?xml version="1.0" encoding="utf-8"?>
-<p:sld xmlns:a="http://schemas.openxmlformats.org/drawingml/2006/main" xmlns:r="http://schemas.openxmlformats.org/officeDocument/2006/relationships" xmlns:p="http://schemas.openxmlformats.org/presentationml/2006/main">
-  <p:cSld>
-    <p:spTree>
-      <p:nvGrpSpPr>
-        <p:cNvPr id="1" name=""/>
-        <p:cNvGrpSpPr/>
-        <p:nvPr/>
-      </p:nvGrpSpPr>
-      <p:grpSpPr>
-        <a:xfrm>
-          <a:off x="0" y="0"/>
-          <a:ext cx="0" cy="0"/>
-          <a:chOff x="0" y="0"/>
-          <a:chExt cx="0" cy="0"/>
-        </a:xfrm>
-      </p:grpSpPr>
-    </p:spTree>
-    <p:extLst>
-      <p:ext uri="{BB962C8B-B14F-4D97-AF65-F5344CB8AC3E}">
-        <p14:creationId xmlns:p14="http://schemas.microsoft.com/office/powerpoint/2010/main" val="789122042"/>
       </p:ext>
     </p:extLst>
   </p:cSld>

</xml_diff>